<commit_message>
cross validation with random effect adjustments by condition
</commit_message>
<xml_diff>
--- a/babies/baby-experiment-broken-design/design/design_main.pptx
+++ b/babies/baby-experiment-broken-design/design/design_main.pptx
@@ -7,20 +7,21 @@
   <p:sldIdLst>
     <p:sldId id="286" r:id="rId2"/>
     <p:sldId id="303" r:id="rId3"/>
-    <p:sldId id="304" r:id="rId4"/>
-    <p:sldId id="292" r:id="rId5"/>
-    <p:sldId id="291" r:id="rId6"/>
-    <p:sldId id="287" r:id="rId7"/>
-    <p:sldId id="293" r:id="rId8"/>
-    <p:sldId id="298" r:id="rId9"/>
-    <p:sldId id="297" r:id="rId10"/>
-    <p:sldId id="294" r:id="rId11"/>
-    <p:sldId id="300" r:id="rId12"/>
-    <p:sldId id="301" r:id="rId13"/>
-    <p:sldId id="302" r:id="rId14"/>
-    <p:sldId id="290" r:id="rId15"/>
-    <p:sldId id="288" r:id="rId16"/>
-    <p:sldId id="289" r:id="rId17"/>
+    <p:sldId id="305" r:id="rId4"/>
+    <p:sldId id="304" r:id="rId5"/>
+    <p:sldId id="292" r:id="rId6"/>
+    <p:sldId id="291" r:id="rId7"/>
+    <p:sldId id="287" r:id="rId8"/>
+    <p:sldId id="293" r:id="rId9"/>
+    <p:sldId id="298" r:id="rId10"/>
+    <p:sldId id="297" r:id="rId11"/>
+    <p:sldId id="294" r:id="rId12"/>
+    <p:sldId id="300" r:id="rId13"/>
+    <p:sldId id="301" r:id="rId14"/>
+    <p:sldId id="302" r:id="rId15"/>
+    <p:sldId id="290" r:id="rId16"/>
+    <p:sldId id="288" r:id="rId17"/>
+    <p:sldId id="289" r:id="rId18"/>
   </p:sldIdLst>
   <p:sldSz cx="12192000" cy="6858000"/>
   <p:notesSz cx="6858000" cy="9144000"/>
@@ -274,7 +275,7 @@
           <a:p>
             <a:fld id="{E8F8EB17-2345-364F-A89F-72CDC5411C28}" type="datetimeFigureOut">
               <a:rPr lang="en-US" smtClean="0"/>
-              <a:t>7/19/21</a:t>
+              <a:t>10/11/23</a:t>
             </a:fld>
             <a:endParaRPr lang="en-US"/>
           </a:p>
@@ -472,7 +473,7 @@
           <a:p>
             <a:fld id="{E8F8EB17-2345-364F-A89F-72CDC5411C28}" type="datetimeFigureOut">
               <a:rPr lang="en-US" smtClean="0"/>
-              <a:t>7/19/21</a:t>
+              <a:t>10/11/23</a:t>
             </a:fld>
             <a:endParaRPr lang="en-US"/>
           </a:p>
@@ -680,7 +681,7 @@
           <a:p>
             <a:fld id="{E8F8EB17-2345-364F-A89F-72CDC5411C28}" type="datetimeFigureOut">
               <a:rPr lang="en-US" smtClean="0"/>
-              <a:t>7/19/21</a:t>
+              <a:t>10/11/23</a:t>
             </a:fld>
             <a:endParaRPr lang="en-US"/>
           </a:p>
@@ -878,7 +879,7 @@
           <a:p>
             <a:fld id="{E8F8EB17-2345-364F-A89F-72CDC5411C28}" type="datetimeFigureOut">
               <a:rPr lang="en-US" smtClean="0"/>
-              <a:t>7/19/21</a:t>
+              <a:t>10/11/23</a:t>
             </a:fld>
             <a:endParaRPr lang="en-US"/>
           </a:p>
@@ -1153,7 +1154,7 @@
           <a:p>
             <a:fld id="{E8F8EB17-2345-364F-A89F-72CDC5411C28}" type="datetimeFigureOut">
               <a:rPr lang="en-US" smtClean="0"/>
-              <a:t>7/19/21</a:t>
+              <a:t>10/11/23</a:t>
             </a:fld>
             <a:endParaRPr lang="en-US"/>
           </a:p>
@@ -1418,7 +1419,7 @@
           <a:p>
             <a:fld id="{E8F8EB17-2345-364F-A89F-72CDC5411C28}" type="datetimeFigureOut">
               <a:rPr lang="en-US" smtClean="0"/>
-              <a:t>7/19/21</a:t>
+              <a:t>10/11/23</a:t>
             </a:fld>
             <a:endParaRPr lang="en-US"/>
           </a:p>
@@ -1830,7 +1831,7 @@
           <a:p>
             <a:fld id="{E8F8EB17-2345-364F-A89F-72CDC5411C28}" type="datetimeFigureOut">
               <a:rPr lang="en-US" smtClean="0"/>
-              <a:t>7/19/21</a:t>
+              <a:t>10/11/23</a:t>
             </a:fld>
             <a:endParaRPr lang="en-US"/>
           </a:p>
@@ -1971,7 +1972,7 @@
           <a:p>
             <a:fld id="{E8F8EB17-2345-364F-A89F-72CDC5411C28}" type="datetimeFigureOut">
               <a:rPr lang="en-US" smtClean="0"/>
-              <a:t>7/19/21</a:t>
+              <a:t>10/11/23</a:t>
             </a:fld>
             <a:endParaRPr lang="en-US"/>
           </a:p>
@@ -2084,7 +2085,7 @@
           <a:p>
             <a:fld id="{E8F8EB17-2345-364F-A89F-72CDC5411C28}" type="datetimeFigureOut">
               <a:rPr lang="en-US" smtClean="0"/>
-              <a:t>7/19/21</a:t>
+              <a:t>10/11/23</a:t>
             </a:fld>
             <a:endParaRPr lang="en-US"/>
           </a:p>
@@ -2395,7 +2396,7 @@
           <a:p>
             <a:fld id="{E8F8EB17-2345-364F-A89F-72CDC5411C28}" type="datetimeFigureOut">
               <a:rPr lang="en-US" smtClean="0"/>
-              <a:t>7/19/21</a:t>
+              <a:t>10/11/23</a:t>
             </a:fld>
             <a:endParaRPr lang="en-US"/>
           </a:p>
@@ -2683,7 +2684,7 @@
           <a:p>
             <a:fld id="{E8F8EB17-2345-364F-A89F-72CDC5411C28}" type="datetimeFigureOut">
               <a:rPr lang="en-US" smtClean="0"/>
-              <a:t>7/19/21</a:t>
+              <a:t>10/11/23</a:t>
             </a:fld>
             <a:endParaRPr lang="en-US"/>
           </a:p>
@@ -2924,7 +2925,7 @@
           <a:p>
             <a:fld id="{E8F8EB17-2345-364F-A89F-72CDC5411C28}" type="datetimeFigureOut">
               <a:rPr lang="en-US" smtClean="0"/>
-              <a:t>7/19/21</a:t>
+              <a:t>10/11/23</a:t>
             </a:fld>
             <a:endParaRPr lang="en-US"/>
           </a:p>
@@ -6141,6 +6142,209 @@
       </p:pic>
       <p:pic>
         <p:nvPicPr>
+          <p:cNvPr id="6" name="Picture 5" descr="A picture containing text&#10;&#10;Description automatically generated">
+            <a:extLst>
+              <a:ext uri="{FF2B5EF4-FFF2-40B4-BE49-F238E27FC236}">
+                <a16:creationId xmlns:a16="http://schemas.microsoft.com/office/drawing/2014/main" id="{41569761-AEA6-7D44-BED4-C9349FFA1D6C}"/>
+              </a:ext>
+            </a:extLst>
+          </p:cNvPr>
+          <p:cNvPicPr>
+            <a:picLocks noChangeAspect="1"/>
+          </p:cNvPicPr>
+          <p:nvPr/>
+        </p:nvPicPr>
+        <p:blipFill rotWithShape="1">
+          <a:blip r:embed="rId2"/>
+          <a:srcRect l="4697" t="20140" r="4719" b="19957"/>
+          <a:stretch/>
+        </p:blipFill>
+        <p:spPr>
+          <a:xfrm>
+            <a:off x="8524964" y="2517567"/>
+            <a:ext cx="3326681" cy="2199903"/>
+          </a:xfrm>
+          <a:prstGeom prst="rect">
+            <a:avLst/>
+          </a:prstGeom>
+        </p:spPr>
+      </p:pic>
+      <p:pic>
+        <p:nvPicPr>
+          <p:cNvPr id="7" name="Picture 6" descr="A picture containing text&#10;&#10;Description automatically generated">
+            <a:extLst>
+              <a:ext uri="{FF2B5EF4-FFF2-40B4-BE49-F238E27FC236}">
+                <a16:creationId xmlns:a16="http://schemas.microsoft.com/office/drawing/2014/main" id="{929A2FA3-3E54-5B46-A09C-1F9FD464AE1B}"/>
+              </a:ext>
+            </a:extLst>
+          </p:cNvPr>
+          <p:cNvPicPr>
+            <a:picLocks noChangeAspect="1"/>
+          </p:cNvPicPr>
+          <p:nvPr/>
+        </p:nvPicPr>
+        <p:blipFill rotWithShape="1">
+          <a:blip r:embed="rId2">
+            <a:duotone>
+              <a:schemeClr val="accent4">
+                <a:shade val="45000"/>
+                <a:satMod val="135000"/>
+              </a:schemeClr>
+              <a:prstClr val="white"/>
+            </a:duotone>
+          </a:blip>
+          <a:srcRect l="4697" t="20140" r="4719" b="19957"/>
+          <a:stretch/>
+        </p:blipFill>
+        <p:spPr>
+          <a:xfrm>
+            <a:off x="4432659" y="2517567"/>
+            <a:ext cx="3326682" cy="2199904"/>
+          </a:xfrm>
+          <a:prstGeom prst="rect">
+            <a:avLst/>
+          </a:prstGeom>
+        </p:spPr>
+      </p:pic>
+    </p:spTree>
+    <p:extLst>
+      <p:ext uri="{BB962C8B-B14F-4D97-AF65-F5344CB8AC3E}">
+        <p14:creationId xmlns:p14="http://schemas.microsoft.com/office/powerpoint/2010/main" val="2937348982"/>
+      </p:ext>
+    </p:extLst>
+  </p:cSld>
+  <p:clrMapOvr>
+    <a:masterClrMapping/>
+  </p:clrMapOvr>
+  <p:timing>
+    <p:tnLst>
+      <p:par>
+        <p:cTn id="1" dur="indefinite" restart="never" nodeType="tmRoot">
+          <p:childTnLst>
+            <p:seq concurrent="1" nextAc="seek">
+              <p:cTn id="2" dur="indefinite" nodeType="mainSeq">
+                <p:childTnLst>
+                  <p:par>
+                    <p:cTn id="3" fill="hold">
+                      <p:stCondLst>
+                        <p:cond delay="indefinite"/>
+                        <p:cond evt="onBegin" delay="0">
+                          <p:tn val="2"/>
+                        </p:cond>
+                      </p:stCondLst>
+                      <p:childTnLst>
+                        <p:par>
+                          <p:cTn id="4" fill="hold">
+                            <p:stCondLst>
+                              <p:cond delay="0"/>
+                            </p:stCondLst>
+                            <p:childTnLst>
+                              <p:par>
+                                <p:cTn id="5" presetID="1" presetClass="exit" presetSubtype="0" fill="hold" nodeType="afterEffect">
+                                  <p:stCondLst>
+                                    <p:cond delay="700"/>
+                                  </p:stCondLst>
+                                  <p:childTnLst>
+                                    <p:set>
+                                      <p:cBhvr>
+                                        <p:cTn id="6" dur="1" fill="hold">
+                                          <p:stCondLst>
+                                            <p:cond delay="0"/>
+                                          </p:stCondLst>
+                                        </p:cTn>
+                                        <p:tgtEl>
+                                          <p:spTgt spid="7"/>
+                                        </p:tgtEl>
+                                        <p:attrNameLst>
+                                          <p:attrName>style.visibility</p:attrName>
+                                        </p:attrNameLst>
+                                      </p:cBhvr>
+                                      <p:to>
+                                        <p:strVal val="hidden"/>
+                                      </p:to>
+                                    </p:set>
+                                  </p:childTnLst>
+                                </p:cTn>
+                              </p:par>
+                            </p:childTnLst>
+                          </p:cTn>
+                        </p:par>
+                      </p:childTnLst>
+                    </p:cTn>
+                  </p:par>
+                </p:childTnLst>
+              </p:cTn>
+              <p:prevCondLst>
+                <p:cond evt="onPrev" delay="0">
+                  <p:tgtEl>
+                    <p:sldTgt/>
+                  </p:tgtEl>
+                </p:cond>
+              </p:prevCondLst>
+              <p:nextCondLst>
+                <p:cond evt="onNext" delay="0">
+                  <p:tgtEl>
+                    <p:sldTgt/>
+                  </p:tgtEl>
+                </p:cond>
+              </p:nextCondLst>
+            </p:seq>
+          </p:childTnLst>
+        </p:cTn>
+      </p:par>
+    </p:tnLst>
+  </p:timing>
+</p:sld>
+</file>
+
+<file path=ppt/slides/slide11.xml><?xml version="1.0" encoding="utf-8"?>
+<p:sld xmlns:a="http://schemas.openxmlformats.org/drawingml/2006/main" xmlns:r="http://schemas.openxmlformats.org/officeDocument/2006/relationships" xmlns:p="http://schemas.openxmlformats.org/presentationml/2006/main">
+  <p:cSld>
+    <p:spTree>
+      <p:nvGrpSpPr>
+        <p:cNvPr id="1" name=""/>
+        <p:cNvGrpSpPr/>
+        <p:nvPr/>
+      </p:nvGrpSpPr>
+      <p:grpSpPr>
+        <a:xfrm>
+          <a:off x="0" y="0"/>
+          <a:ext cx="0" cy="0"/>
+          <a:chOff x="0" y="0"/>
+          <a:chExt cx="0" cy="0"/>
+        </a:xfrm>
+      </p:grpSpPr>
+      <p:pic>
+        <p:nvPicPr>
+          <p:cNvPr id="18" name="Picture 17" descr="A picture containing text&#10;&#10;Description automatically generated">
+            <a:extLst>
+              <a:ext uri="{FF2B5EF4-FFF2-40B4-BE49-F238E27FC236}">
+                <a16:creationId xmlns:a16="http://schemas.microsoft.com/office/drawing/2014/main" id="{94578D29-70AC-C948-BA7F-69991F353187}"/>
+              </a:ext>
+            </a:extLst>
+          </p:cNvPr>
+          <p:cNvPicPr>
+            <a:picLocks noChangeAspect="1"/>
+          </p:cNvPicPr>
+          <p:nvPr/>
+        </p:nvPicPr>
+        <p:blipFill rotWithShape="1">
+          <a:blip r:embed="rId2"/>
+          <a:srcRect l="4697" t="20140" r="4719" b="19957"/>
+          <a:stretch/>
+        </p:blipFill>
+        <p:spPr>
+          <a:xfrm>
+            <a:off x="340355" y="2517568"/>
+            <a:ext cx="3326681" cy="2199903"/>
+          </a:xfrm>
+          <a:prstGeom prst="rect">
+            <a:avLst/>
+          </a:prstGeom>
+        </p:spPr>
+      </p:pic>
+      <p:pic>
+        <p:nvPicPr>
           <p:cNvPr id="30" name="Picture 29" descr="A picture containing text&#10;&#10;Description automatically generated">
             <a:extLst>
               <a:ext uri="{FF2B5EF4-FFF2-40B4-BE49-F238E27FC236}">
@@ -6296,7 +6500,7 @@
 </p:sld>
 </file>
 
-<file path=ppt/slides/slide11.xml><?xml version="1.0" encoding="utf-8"?>
+<file path=ppt/slides/slide12.xml><?xml version="1.0" encoding="utf-8"?>
 <p:sld xmlns:a="http://schemas.openxmlformats.org/drawingml/2006/main" xmlns:r="http://schemas.openxmlformats.org/officeDocument/2006/relationships" xmlns:p="http://schemas.openxmlformats.org/presentationml/2006/main">
   <p:cSld>
     <p:spTree>
@@ -6570,7 +6774,7 @@
 </p:sld>
 </file>
 
-<file path=ppt/slides/slide12.xml><?xml version="1.0" encoding="utf-8"?>
+<file path=ppt/slides/slide13.xml><?xml version="1.0" encoding="utf-8"?>
 <p:sld xmlns:a="http://schemas.openxmlformats.org/drawingml/2006/main" xmlns:r="http://schemas.openxmlformats.org/officeDocument/2006/relationships" xmlns:p="http://schemas.openxmlformats.org/presentationml/2006/main">
   <p:cSld>
     <p:spTree>
@@ -6838,7 +7042,7 @@
 </p:sld>
 </file>
 
-<file path=ppt/slides/slide13.xml><?xml version="1.0" encoding="utf-8"?>
+<file path=ppt/slides/slide14.xml><?xml version="1.0" encoding="utf-8"?>
 <p:sld xmlns:a="http://schemas.openxmlformats.org/drawingml/2006/main" xmlns:r="http://schemas.openxmlformats.org/officeDocument/2006/relationships" xmlns:p="http://schemas.openxmlformats.org/presentationml/2006/main">
   <p:cSld>
     <p:spTree>
@@ -7115,7 +7319,7 @@
 </p:sld>
 </file>
 
-<file path=ppt/slides/slide14.xml><?xml version="1.0" encoding="utf-8"?>
+<file path=ppt/slides/slide15.xml><?xml version="1.0" encoding="utf-8"?>
 <p:sld xmlns:a="http://schemas.openxmlformats.org/drawingml/2006/main" xmlns:r="http://schemas.openxmlformats.org/officeDocument/2006/relationships" xmlns:p="http://schemas.openxmlformats.org/presentationml/2006/main">
   <p:cSld>
     <p:spTree>
@@ -7145,7 +7349,7 @@
 </p:sld>
 </file>
 
-<file path=ppt/slides/slide15.xml><?xml version="1.0" encoding="utf-8"?>
+<file path=ppt/slides/slide16.xml><?xml version="1.0" encoding="utf-8"?>
 <p:sld xmlns:a="http://schemas.openxmlformats.org/drawingml/2006/main" xmlns:r="http://schemas.openxmlformats.org/officeDocument/2006/relationships" xmlns:p="http://schemas.openxmlformats.org/presentationml/2006/main">
   <p:cSld>
     <p:spTree>
@@ -7225,7 +7429,7 @@
 </p:sld>
 </file>
 
-<file path=ppt/slides/slide16.xml><?xml version="1.0" encoding="utf-8"?>
+<file path=ppt/slides/slide17.xml><?xml version="1.0" encoding="utf-8"?>
 <p:sld xmlns:a="http://schemas.openxmlformats.org/drawingml/2006/main" xmlns:r="http://schemas.openxmlformats.org/officeDocument/2006/relationships" xmlns:p="http://schemas.openxmlformats.org/presentationml/2006/main">
   <p:cSld>
     <p:spTree>
@@ -10121,6 +10325,2699 @@
           <a:chExt cx="0" cy="0"/>
         </a:xfrm>
       </p:grpSpPr>
+      <p:pic>
+        <p:nvPicPr>
+          <p:cNvPr id="70" name="Picture 69">
+            <a:extLst>
+              <a:ext uri="{FF2B5EF4-FFF2-40B4-BE49-F238E27FC236}">
+                <a16:creationId xmlns:a16="http://schemas.microsoft.com/office/drawing/2014/main" id="{35DB3981-7EB8-2CFA-B736-B7EEB1F23055}"/>
+              </a:ext>
+            </a:extLst>
+          </p:cNvPr>
+          <p:cNvPicPr>
+            <a:picLocks noChangeAspect="1"/>
+          </p:cNvPicPr>
+          <p:nvPr/>
+        </p:nvPicPr>
+        <p:blipFill>
+          <a:blip r:embed="rId2"/>
+          <a:stretch>
+            <a:fillRect/>
+          </a:stretch>
+        </p:blipFill>
+        <p:spPr>
+          <a:xfrm>
+            <a:off x="11006303" y="4426836"/>
+            <a:ext cx="1123773" cy="1063803"/>
+          </a:xfrm>
+          <a:prstGeom prst="rect">
+            <a:avLst/>
+          </a:prstGeom>
+        </p:spPr>
+      </p:pic>
+      <p:pic>
+        <p:nvPicPr>
+          <p:cNvPr id="68" name="Picture 67">
+            <a:extLst>
+              <a:ext uri="{FF2B5EF4-FFF2-40B4-BE49-F238E27FC236}">
+                <a16:creationId xmlns:a16="http://schemas.microsoft.com/office/drawing/2014/main" id="{A1FC20A1-99DF-D4EA-9182-D09A7BC4704D}"/>
+              </a:ext>
+            </a:extLst>
+          </p:cNvPr>
+          <p:cNvPicPr>
+            <a:picLocks noChangeAspect="1"/>
+          </p:cNvPicPr>
+          <p:nvPr/>
+        </p:nvPicPr>
+        <p:blipFill>
+          <a:blip r:embed="rId3"/>
+          <a:stretch>
+            <a:fillRect/>
+          </a:stretch>
+        </p:blipFill>
+        <p:spPr>
+          <a:xfrm>
+            <a:off x="11060522" y="5747471"/>
+            <a:ext cx="1123773" cy="1039279"/>
+          </a:xfrm>
+          <a:prstGeom prst="rect">
+            <a:avLst/>
+          </a:prstGeom>
+        </p:spPr>
+      </p:pic>
+      <p:cxnSp>
+        <p:nvCxnSpPr>
+          <p:cNvPr id="18" name="Straight Arrow Connector 17">
+            <a:extLst>
+              <a:ext uri="{FF2B5EF4-FFF2-40B4-BE49-F238E27FC236}">
+                <a16:creationId xmlns:a16="http://schemas.microsoft.com/office/drawing/2014/main" id="{14ED3B48-B725-FA4A-9811-8A8A6156BF05}"/>
+              </a:ext>
+            </a:extLst>
+          </p:cNvPr>
+          <p:cNvCxnSpPr>
+            <a:cxnSpLocks/>
+          </p:cNvCxnSpPr>
+          <p:nvPr/>
+        </p:nvCxnSpPr>
+        <p:spPr>
+          <a:xfrm flipV="1">
+            <a:off x="6546231" y="1223033"/>
+            <a:ext cx="1149773" cy="422212"/>
+          </a:xfrm>
+          <a:prstGeom prst="straightConnector1">
+            <a:avLst/>
+          </a:prstGeom>
+          <a:ln w="57150">
+            <a:solidFill>
+              <a:schemeClr val="tx1">
+                <a:lumMod val="85000"/>
+                <a:lumOff val="15000"/>
+              </a:schemeClr>
+            </a:solidFill>
+            <a:tailEnd type="oval"/>
+          </a:ln>
+        </p:spPr>
+        <p:style>
+          <a:lnRef idx="3">
+            <a:schemeClr val="accent6"/>
+          </a:lnRef>
+          <a:fillRef idx="0">
+            <a:schemeClr val="accent6"/>
+          </a:fillRef>
+          <a:effectRef idx="2">
+            <a:schemeClr val="accent6"/>
+          </a:effectRef>
+          <a:fontRef idx="minor">
+            <a:schemeClr val="tx1"/>
+          </a:fontRef>
+        </p:style>
+      </p:cxnSp>
+      <p:cxnSp>
+        <p:nvCxnSpPr>
+          <p:cNvPr id="20" name="Straight Arrow Connector 19">
+            <a:extLst>
+              <a:ext uri="{FF2B5EF4-FFF2-40B4-BE49-F238E27FC236}">
+                <a16:creationId xmlns:a16="http://schemas.microsoft.com/office/drawing/2014/main" id="{3B973D0A-0BE6-174D-BF26-13B234A94825}"/>
+              </a:ext>
+            </a:extLst>
+          </p:cNvPr>
+          <p:cNvCxnSpPr>
+            <a:cxnSpLocks/>
+          </p:cNvCxnSpPr>
+          <p:nvPr/>
+        </p:nvCxnSpPr>
+        <p:spPr>
+          <a:xfrm>
+            <a:off x="6563965" y="2017967"/>
+            <a:ext cx="1152144" cy="420624"/>
+          </a:xfrm>
+          <a:prstGeom prst="straightConnector1">
+            <a:avLst/>
+          </a:prstGeom>
+          <a:ln w="57150">
+            <a:solidFill>
+              <a:srgbClr val="FF0000"/>
+            </a:solidFill>
+            <a:tailEnd type="oval"/>
+          </a:ln>
+        </p:spPr>
+        <p:style>
+          <a:lnRef idx="3">
+            <a:schemeClr val="accent6"/>
+          </a:lnRef>
+          <a:fillRef idx="0">
+            <a:schemeClr val="accent6"/>
+          </a:fillRef>
+          <a:effectRef idx="2">
+            <a:schemeClr val="accent6"/>
+          </a:effectRef>
+          <a:fontRef idx="minor">
+            <a:schemeClr val="tx1"/>
+          </a:fontRef>
+        </p:style>
+      </p:cxnSp>
+      <p:cxnSp>
+        <p:nvCxnSpPr>
+          <p:cNvPr id="34" name="Straight Arrow Connector 33">
+            <a:extLst>
+              <a:ext uri="{FF2B5EF4-FFF2-40B4-BE49-F238E27FC236}">
+                <a16:creationId xmlns:a16="http://schemas.microsoft.com/office/drawing/2014/main" id="{AB5EDE9F-F2A8-0442-A27B-6D89F3217A11}"/>
+              </a:ext>
+            </a:extLst>
+          </p:cNvPr>
+          <p:cNvCxnSpPr>
+            <a:cxnSpLocks/>
+          </p:cNvCxnSpPr>
+          <p:nvPr/>
+        </p:nvCxnSpPr>
+        <p:spPr>
+          <a:xfrm flipV="1">
+            <a:off x="8122861" y="3065007"/>
+            <a:ext cx="1149773" cy="422212"/>
+          </a:xfrm>
+          <a:prstGeom prst="straightConnector1">
+            <a:avLst/>
+          </a:prstGeom>
+          <a:ln w="57150">
+            <a:solidFill>
+              <a:schemeClr val="tx1">
+                <a:lumMod val="85000"/>
+                <a:lumOff val="15000"/>
+              </a:schemeClr>
+            </a:solidFill>
+            <a:tailEnd type="oval"/>
+          </a:ln>
+        </p:spPr>
+        <p:style>
+          <a:lnRef idx="3">
+            <a:schemeClr val="accent6"/>
+          </a:lnRef>
+          <a:fillRef idx="0">
+            <a:schemeClr val="accent6"/>
+          </a:fillRef>
+          <a:effectRef idx="2">
+            <a:schemeClr val="accent6"/>
+          </a:effectRef>
+          <a:fontRef idx="minor">
+            <a:schemeClr val="tx1"/>
+          </a:fontRef>
+        </p:style>
+      </p:cxnSp>
+      <p:cxnSp>
+        <p:nvCxnSpPr>
+          <p:cNvPr id="35" name="Straight Arrow Connector 34">
+            <a:extLst>
+              <a:ext uri="{FF2B5EF4-FFF2-40B4-BE49-F238E27FC236}">
+                <a16:creationId xmlns:a16="http://schemas.microsoft.com/office/drawing/2014/main" id="{D4EA9DDE-CD36-DC43-93AB-41C4F2C01ADE}"/>
+              </a:ext>
+            </a:extLst>
+          </p:cNvPr>
+          <p:cNvCxnSpPr>
+            <a:cxnSpLocks/>
+          </p:cNvCxnSpPr>
+          <p:nvPr/>
+        </p:nvCxnSpPr>
+        <p:spPr>
+          <a:xfrm>
+            <a:off x="8140595" y="3859941"/>
+            <a:ext cx="1152144" cy="420624"/>
+          </a:xfrm>
+          <a:prstGeom prst="straightConnector1">
+            <a:avLst/>
+          </a:prstGeom>
+          <a:ln w="57150">
+            <a:solidFill>
+              <a:srgbClr val="FF0000"/>
+            </a:solidFill>
+            <a:tailEnd type="oval"/>
+          </a:ln>
+        </p:spPr>
+        <p:style>
+          <a:lnRef idx="3">
+            <a:schemeClr val="accent6"/>
+          </a:lnRef>
+          <a:fillRef idx="0">
+            <a:schemeClr val="accent6"/>
+          </a:fillRef>
+          <a:effectRef idx="2">
+            <a:schemeClr val="accent6"/>
+          </a:effectRef>
+          <a:fontRef idx="minor">
+            <a:schemeClr val="tx1"/>
+          </a:fontRef>
+        </p:style>
+      </p:cxnSp>
+      <p:cxnSp>
+        <p:nvCxnSpPr>
+          <p:cNvPr id="36" name="Straight Arrow Connector 35">
+            <a:extLst>
+              <a:ext uri="{FF2B5EF4-FFF2-40B4-BE49-F238E27FC236}">
+                <a16:creationId xmlns:a16="http://schemas.microsoft.com/office/drawing/2014/main" id="{0216E98A-38F2-5844-BB08-B567B7BB3E58}"/>
+              </a:ext>
+            </a:extLst>
+          </p:cNvPr>
+          <p:cNvCxnSpPr>
+            <a:cxnSpLocks/>
+          </p:cNvCxnSpPr>
+          <p:nvPr/>
+        </p:nvCxnSpPr>
+        <p:spPr>
+          <a:xfrm flipV="1">
+            <a:off x="9676550" y="5084253"/>
+            <a:ext cx="1149773" cy="422212"/>
+          </a:xfrm>
+          <a:prstGeom prst="straightConnector1">
+            <a:avLst/>
+          </a:prstGeom>
+          <a:ln w="57150">
+            <a:solidFill>
+              <a:schemeClr val="tx1">
+                <a:lumMod val="85000"/>
+                <a:lumOff val="15000"/>
+              </a:schemeClr>
+            </a:solidFill>
+            <a:tailEnd type="oval"/>
+          </a:ln>
+        </p:spPr>
+        <p:style>
+          <a:lnRef idx="3">
+            <a:schemeClr val="accent6"/>
+          </a:lnRef>
+          <a:fillRef idx="0">
+            <a:schemeClr val="accent6"/>
+          </a:fillRef>
+          <a:effectRef idx="2">
+            <a:schemeClr val="accent6"/>
+          </a:effectRef>
+          <a:fontRef idx="minor">
+            <a:schemeClr val="tx1"/>
+          </a:fontRef>
+        </p:style>
+      </p:cxnSp>
+      <p:cxnSp>
+        <p:nvCxnSpPr>
+          <p:cNvPr id="37" name="Straight Arrow Connector 36">
+            <a:extLst>
+              <a:ext uri="{FF2B5EF4-FFF2-40B4-BE49-F238E27FC236}">
+                <a16:creationId xmlns:a16="http://schemas.microsoft.com/office/drawing/2014/main" id="{A56E7817-676D-C245-8BA7-F88C5AD5AF6C}"/>
+              </a:ext>
+            </a:extLst>
+          </p:cNvPr>
+          <p:cNvCxnSpPr>
+            <a:cxnSpLocks/>
+          </p:cNvCxnSpPr>
+          <p:nvPr/>
+        </p:nvCxnSpPr>
+        <p:spPr>
+          <a:xfrm>
+            <a:off x="9694284" y="5879187"/>
+            <a:ext cx="1152144" cy="420624"/>
+          </a:xfrm>
+          <a:prstGeom prst="straightConnector1">
+            <a:avLst/>
+          </a:prstGeom>
+          <a:ln w="57150">
+            <a:solidFill>
+              <a:srgbClr val="FF0000"/>
+            </a:solidFill>
+            <a:tailEnd type="oval"/>
+          </a:ln>
+        </p:spPr>
+        <p:style>
+          <a:lnRef idx="3">
+            <a:schemeClr val="accent6"/>
+          </a:lnRef>
+          <a:fillRef idx="0">
+            <a:schemeClr val="accent6"/>
+          </a:fillRef>
+          <a:effectRef idx="2">
+            <a:schemeClr val="accent6"/>
+          </a:effectRef>
+          <a:fontRef idx="minor">
+            <a:schemeClr val="tx1"/>
+          </a:fontRef>
+        </p:style>
+      </p:cxnSp>
+      <p:sp>
+        <p:nvSpPr>
+          <p:cNvPr id="57" name="TextBox 56">
+            <a:extLst>
+              <a:ext uri="{FF2B5EF4-FFF2-40B4-BE49-F238E27FC236}">
+                <a16:creationId xmlns:a16="http://schemas.microsoft.com/office/drawing/2014/main" id="{872152CE-5600-334B-BDAE-9446DD1941C9}"/>
+              </a:ext>
+            </a:extLst>
+          </p:cNvPr>
+          <p:cNvSpPr txBox="1"/>
+          <p:nvPr/>
+        </p:nvSpPr>
+        <p:spPr>
+          <a:xfrm>
+            <a:off x="3748232" y="1233660"/>
+            <a:ext cx="1514901" cy="461665"/>
+          </a:xfrm>
+          <a:prstGeom prst="rect">
+            <a:avLst/>
+          </a:prstGeom>
+          <a:noFill/>
+        </p:spPr>
+        <p:txBody>
+          <a:bodyPr wrap="square" rtlCol="0">
+            <a:spAutoFit/>
+          </a:bodyPr>
+          <a:lstStyle/>
+          <a:p>
+            <a:r>
+              <a:rPr lang="en-US" sz="2400" b="1" dirty="0"/>
+              <a:t>1 trial</a:t>
+            </a:r>
+          </a:p>
+        </p:txBody>
+      </p:sp>
+      <p:sp>
+        <p:nvSpPr>
+          <p:cNvPr id="2" name="Oval 1">
+            <a:extLst>
+              <a:ext uri="{FF2B5EF4-FFF2-40B4-BE49-F238E27FC236}">
+                <a16:creationId xmlns:a16="http://schemas.microsoft.com/office/drawing/2014/main" id="{647E7E2D-C603-154A-A003-5371746B4456}"/>
+              </a:ext>
+            </a:extLst>
+          </p:cNvPr>
+          <p:cNvSpPr/>
+          <p:nvPr/>
+        </p:nvSpPr>
+        <p:spPr>
+          <a:xfrm>
+            <a:off x="4299102" y="1707395"/>
+            <a:ext cx="374058" cy="374904"/>
+          </a:xfrm>
+          <a:prstGeom prst="ellipse">
+            <a:avLst/>
+          </a:prstGeom>
+          <a:solidFill>
+            <a:schemeClr val="tx1">
+              <a:lumMod val="85000"/>
+              <a:lumOff val="15000"/>
+            </a:schemeClr>
+          </a:solidFill>
+        </p:spPr>
+        <p:style>
+          <a:lnRef idx="2">
+            <a:schemeClr val="accent1">
+              <a:shade val="50000"/>
+            </a:schemeClr>
+          </a:lnRef>
+          <a:fillRef idx="1">
+            <a:schemeClr val="accent1"/>
+          </a:fillRef>
+          <a:effectRef idx="0">
+            <a:schemeClr val="accent1"/>
+          </a:effectRef>
+          <a:fontRef idx="minor">
+            <a:schemeClr val="lt1"/>
+          </a:fontRef>
+        </p:style>
+        <p:txBody>
+          <a:bodyPr rtlCol="0" anchor="ctr"/>
+          <a:lstStyle/>
+          <a:p>
+            <a:pPr algn="ctr"/>
+            <a:endParaRPr lang="en-US"/>
+          </a:p>
+        </p:txBody>
+      </p:sp>
+      <p:sp>
+        <p:nvSpPr>
+          <p:cNvPr id="58" name="TextBox 57">
+            <a:extLst>
+              <a:ext uri="{FF2B5EF4-FFF2-40B4-BE49-F238E27FC236}">
+                <a16:creationId xmlns:a16="http://schemas.microsoft.com/office/drawing/2014/main" id="{B8600B55-C41A-554B-B73F-E5C9633F9094}"/>
+              </a:ext>
+            </a:extLst>
+          </p:cNvPr>
+          <p:cNvSpPr txBox="1"/>
+          <p:nvPr/>
+        </p:nvSpPr>
+        <p:spPr>
+          <a:xfrm>
+            <a:off x="4673160" y="3027874"/>
+            <a:ext cx="1514901" cy="461665"/>
+          </a:xfrm>
+          <a:prstGeom prst="rect">
+            <a:avLst/>
+          </a:prstGeom>
+          <a:noFill/>
+        </p:spPr>
+        <p:txBody>
+          <a:bodyPr wrap="square" rtlCol="0">
+            <a:spAutoFit/>
+          </a:bodyPr>
+          <a:lstStyle/>
+          <a:p>
+            <a:r>
+              <a:rPr lang="en-US" sz="2400" b="1" dirty="0"/>
+              <a:t>3 trials</a:t>
+            </a:r>
+          </a:p>
+        </p:txBody>
+      </p:sp>
+      <p:grpSp>
+        <p:nvGrpSpPr>
+          <p:cNvPr id="6" name="Group 5">
+            <a:extLst>
+              <a:ext uri="{FF2B5EF4-FFF2-40B4-BE49-F238E27FC236}">
+                <a16:creationId xmlns:a16="http://schemas.microsoft.com/office/drawing/2014/main" id="{093BD00E-D521-5442-840E-3EADC39EAD97}"/>
+              </a:ext>
+            </a:extLst>
+          </p:cNvPr>
+          <p:cNvGrpSpPr/>
+          <p:nvPr/>
+        </p:nvGrpSpPr>
+        <p:grpSpPr>
+          <a:xfrm>
+            <a:off x="4260689" y="3573812"/>
+            <a:ext cx="1709683" cy="387327"/>
+            <a:chOff x="3881580" y="3600241"/>
+            <a:chExt cx="1709683" cy="387327"/>
+          </a:xfrm>
+          <a:solidFill>
+            <a:schemeClr val="tx1">
+              <a:lumMod val="85000"/>
+              <a:lumOff val="15000"/>
+            </a:schemeClr>
+          </a:solidFill>
+        </p:grpSpPr>
+        <p:sp>
+          <p:nvSpPr>
+            <p:cNvPr id="27" name="Oval 26">
+              <a:extLst>
+                <a:ext uri="{FF2B5EF4-FFF2-40B4-BE49-F238E27FC236}">
+                  <a16:creationId xmlns:a16="http://schemas.microsoft.com/office/drawing/2014/main" id="{E2BD01F8-0BB3-D541-B881-B006F535B127}"/>
+                </a:ext>
+              </a:extLst>
+            </p:cNvPr>
+            <p:cNvSpPr/>
+            <p:nvPr/>
+          </p:nvSpPr>
+          <p:spPr>
+            <a:xfrm>
+              <a:off x="3881580" y="3600241"/>
+              <a:ext cx="374058" cy="374904"/>
+            </a:xfrm>
+            <a:prstGeom prst="ellipse">
+              <a:avLst/>
+            </a:prstGeom>
+            <a:grpFill/>
+          </p:spPr>
+          <p:style>
+            <a:lnRef idx="2">
+              <a:schemeClr val="accent1">
+                <a:shade val="50000"/>
+              </a:schemeClr>
+            </a:lnRef>
+            <a:fillRef idx="1">
+              <a:schemeClr val="accent1"/>
+            </a:fillRef>
+            <a:effectRef idx="0">
+              <a:schemeClr val="accent1"/>
+            </a:effectRef>
+            <a:fontRef idx="minor">
+              <a:schemeClr val="lt1"/>
+            </a:fontRef>
+          </p:style>
+          <p:txBody>
+            <a:bodyPr rtlCol="0" anchor="ctr"/>
+            <a:lstStyle/>
+            <a:p>
+              <a:pPr algn="ctr"/>
+              <a:endParaRPr lang="en-US"/>
+            </a:p>
+          </p:txBody>
+        </p:sp>
+        <p:sp>
+          <p:nvSpPr>
+            <p:cNvPr id="28" name="Oval 27">
+              <a:extLst>
+                <a:ext uri="{FF2B5EF4-FFF2-40B4-BE49-F238E27FC236}">
+                  <a16:creationId xmlns:a16="http://schemas.microsoft.com/office/drawing/2014/main" id="{D632D0C8-4C9A-3B44-98A1-AF07EB292B36}"/>
+                </a:ext>
+              </a:extLst>
+            </p:cNvPr>
+            <p:cNvSpPr/>
+            <p:nvPr/>
+          </p:nvSpPr>
+          <p:spPr>
+            <a:xfrm>
+              <a:off x="4549393" y="3612664"/>
+              <a:ext cx="374058" cy="374904"/>
+            </a:xfrm>
+            <a:prstGeom prst="ellipse">
+              <a:avLst/>
+            </a:prstGeom>
+            <a:grpFill/>
+          </p:spPr>
+          <p:style>
+            <a:lnRef idx="2">
+              <a:schemeClr val="accent1">
+                <a:shade val="50000"/>
+              </a:schemeClr>
+            </a:lnRef>
+            <a:fillRef idx="1">
+              <a:schemeClr val="accent1"/>
+            </a:fillRef>
+            <a:effectRef idx="0">
+              <a:schemeClr val="accent1"/>
+            </a:effectRef>
+            <a:fontRef idx="minor">
+              <a:schemeClr val="lt1"/>
+            </a:fontRef>
+          </p:style>
+          <p:txBody>
+            <a:bodyPr rtlCol="0" anchor="ctr"/>
+            <a:lstStyle/>
+            <a:p>
+              <a:pPr algn="ctr"/>
+              <a:endParaRPr lang="en-US"/>
+            </a:p>
+          </p:txBody>
+        </p:sp>
+        <p:sp>
+          <p:nvSpPr>
+            <p:cNvPr id="29" name="Oval 28">
+              <a:extLst>
+                <a:ext uri="{FF2B5EF4-FFF2-40B4-BE49-F238E27FC236}">
+                  <a16:creationId xmlns:a16="http://schemas.microsoft.com/office/drawing/2014/main" id="{DCFF3642-B108-3648-BAFE-1447C398054C}"/>
+                </a:ext>
+              </a:extLst>
+            </p:cNvPr>
+            <p:cNvSpPr/>
+            <p:nvPr/>
+          </p:nvSpPr>
+          <p:spPr>
+            <a:xfrm>
+              <a:off x="5217205" y="3606453"/>
+              <a:ext cx="374058" cy="374904"/>
+            </a:xfrm>
+            <a:prstGeom prst="ellipse">
+              <a:avLst/>
+            </a:prstGeom>
+            <a:grpFill/>
+          </p:spPr>
+          <p:style>
+            <a:lnRef idx="2">
+              <a:schemeClr val="accent1">
+                <a:shade val="50000"/>
+              </a:schemeClr>
+            </a:lnRef>
+            <a:fillRef idx="1">
+              <a:schemeClr val="accent1"/>
+            </a:fillRef>
+            <a:effectRef idx="0">
+              <a:schemeClr val="accent1"/>
+            </a:effectRef>
+            <a:fontRef idx="minor">
+              <a:schemeClr val="lt1"/>
+            </a:fontRef>
+          </p:style>
+          <p:txBody>
+            <a:bodyPr rtlCol="0" anchor="ctr"/>
+            <a:lstStyle/>
+            <a:p>
+              <a:pPr algn="ctr"/>
+              <a:endParaRPr lang="en-US"/>
+            </a:p>
+          </p:txBody>
+        </p:sp>
+      </p:grpSp>
+      <p:sp>
+        <p:nvSpPr>
+          <p:cNvPr id="59" name="TextBox 58">
+            <a:extLst>
+              <a:ext uri="{FF2B5EF4-FFF2-40B4-BE49-F238E27FC236}">
+                <a16:creationId xmlns:a16="http://schemas.microsoft.com/office/drawing/2014/main" id="{49A69490-9ECE-824E-B93D-0795C535CDCC}"/>
+              </a:ext>
+            </a:extLst>
+          </p:cNvPr>
+          <p:cNvSpPr txBox="1"/>
+          <p:nvPr/>
+        </p:nvSpPr>
+        <p:spPr>
+          <a:xfrm>
+            <a:off x="4933680" y="5163578"/>
+            <a:ext cx="1514901" cy="461665"/>
+          </a:xfrm>
+          <a:prstGeom prst="rect">
+            <a:avLst/>
+          </a:prstGeom>
+          <a:noFill/>
+        </p:spPr>
+        <p:txBody>
+          <a:bodyPr wrap="square" rtlCol="0">
+            <a:spAutoFit/>
+          </a:bodyPr>
+          <a:lstStyle/>
+          <a:p>
+            <a:r>
+              <a:rPr lang="en-US" sz="2400" b="1" dirty="0"/>
+              <a:t>9 trials</a:t>
+            </a:r>
+          </a:p>
+        </p:txBody>
+      </p:sp>
+      <p:grpSp>
+        <p:nvGrpSpPr>
+          <p:cNvPr id="5" name="Group 4">
+            <a:extLst>
+              <a:ext uri="{FF2B5EF4-FFF2-40B4-BE49-F238E27FC236}">
+                <a16:creationId xmlns:a16="http://schemas.microsoft.com/office/drawing/2014/main" id="{25EE25C0-B119-9A4A-9470-9145504F3456}"/>
+              </a:ext>
+            </a:extLst>
+          </p:cNvPr>
+          <p:cNvGrpSpPr/>
+          <p:nvPr/>
+        </p:nvGrpSpPr>
+        <p:grpSpPr>
+          <a:xfrm>
+            <a:off x="3081459" y="5672267"/>
+            <a:ext cx="4377826" cy="387327"/>
+            <a:chOff x="3881580" y="5672267"/>
+            <a:chExt cx="4377826" cy="387327"/>
+          </a:xfrm>
+          <a:solidFill>
+            <a:schemeClr val="tx1">
+              <a:lumMod val="85000"/>
+              <a:lumOff val="15000"/>
+            </a:schemeClr>
+          </a:solidFill>
+        </p:grpSpPr>
+        <p:sp>
+          <p:nvSpPr>
+            <p:cNvPr id="32" name="Oval 31">
+              <a:extLst>
+                <a:ext uri="{FF2B5EF4-FFF2-40B4-BE49-F238E27FC236}">
+                  <a16:creationId xmlns:a16="http://schemas.microsoft.com/office/drawing/2014/main" id="{94A8F1DE-87AD-BC4B-888B-D9B83676692A}"/>
+                </a:ext>
+              </a:extLst>
+            </p:cNvPr>
+            <p:cNvSpPr/>
+            <p:nvPr/>
+          </p:nvSpPr>
+          <p:spPr>
+            <a:xfrm>
+              <a:off x="3881580" y="5672267"/>
+              <a:ext cx="374058" cy="374904"/>
+            </a:xfrm>
+            <a:prstGeom prst="ellipse">
+              <a:avLst/>
+            </a:prstGeom>
+            <a:grpFill/>
+          </p:spPr>
+          <p:style>
+            <a:lnRef idx="2">
+              <a:schemeClr val="accent1">
+                <a:shade val="50000"/>
+              </a:schemeClr>
+            </a:lnRef>
+            <a:fillRef idx="1">
+              <a:schemeClr val="accent1"/>
+            </a:fillRef>
+            <a:effectRef idx="0">
+              <a:schemeClr val="accent1"/>
+            </a:effectRef>
+            <a:fontRef idx="minor">
+              <a:schemeClr val="lt1"/>
+            </a:fontRef>
+          </p:style>
+          <p:txBody>
+            <a:bodyPr rtlCol="0" anchor="ctr"/>
+            <a:lstStyle/>
+            <a:p>
+              <a:pPr algn="ctr"/>
+              <a:endParaRPr lang="en-US"/>
+            </a:p>
+          </p:txBody>
+        </p:sp>
+        <p:sp>
+          <p:nvSpPr>
+            <p:cNvPr id="33" name="Oval 32">
+              <a:extLst>
+                <a:ext uri="{FF2B5EF4-FFF2-40B4-BE49-F238E27FC236}">
+                  <a16:creationId xmlns:a16="http://schemas.microsoft.com/office/drawing/2014/main" id="{AF4F9AFD-3959-3D43-B639-CE3054C1FBE6}"/>
+                </a:ext>
+              </a:extLst>
+            </p:cNvPr>
+            <p:cNvSpPr/>
+            <p:nvPr/>
+          </p:nvSpPr>
+          <p:spPr>
+            <a:xfrm>
+              <a:off x="4549393" y="5684690"/>
+              <a:ext cx="374058" cy="374904"/>
+            </a:xfrm>
+            <a:prstGeom prst="ellipse">
+              <a:avLst/>
+            </a:prstGeom>
+            <a:grpFill/>
+          </p:spPr>
+          <p:style>
+            <a:lnRef idx="2">
+              <a:schemeClr val="accent1">
+                <a:shade val="50000"/>
+              </a:schemeClr>
+            </a:lnRef>
+            <a:fillRef idx="1">
+              <a:schemeClr val="accent1"/>
+            </a:fillRef>
+            <a:effectRef idx="0">
+              <a:schemeClr val="accent1"/>
+            </a:effectRef>
+            <a:fontRef idx="minor">
+              <a:schemeClr val="lt1"/>
+            </a:fontRef>
+          </p:style>
+          <p:txBody>
+            <a:bodyPr rtlCol="0" anchor="ctr"/>
+            <a:lstStyle/>
+            <a:p>
+              <a:pPr algn="ctr"/>
+              <a:endParaRPr lang="en-US"/>
+            </a:p>
+          </p:txBody>
+        </p:sp>
+        <p:sp>
+          <p:nvSpPr>
+            <p:cNvPr id="39" name="Oval 38">
+              <a:extLst>
+                <a:ext uri="{FF2B5EF4-FFF2-40B4-BE49-F238E27FC236}">
+                  <a16:creationId xmlns:a16="http://schemas.microsoft.com/office/drawing/2014/main" id="{C40A5B98-C6D5-BE43-A2E3-6497A1F13F59}"/>
+                </a:ext>
+              </a:extLst>
+            </p:cNvPr>
+            <p:cNvSpPr/>
+            <p:nvPr/>
+          </p:nvSpPr>
+          <p:spPr>
+            <a:xfrm>
+              <a:off x="5217205" y="5678479"/>
+              <a:ext cx="374058" cy="374904"/>
+            </a:xfrm>
+            <a:prstGeom prst="ellipse">
+              <a:avLst/>
+            </a:prstGeom>
+            <a:grpFill/>
+          </p:spPr>
+          <p:style>
+            <a:lnRef idx="2">
+              <a:schemeClr val="accent1">
+                <a:shade val="50000"/>
+              </a:schemeClr>
+            </a:lnRef>
+            <a:fillRef idx="1">
+              <a:schemeClr val="accent1"/>
+            </a:fillRef>
+            <a:effectRef idx="0">
+              <a:schemeClr val="accent1"/>
+            </a:effectRef>
+            <a:fontRef idx="minor">
+              <a:schemeClr val="lt1"/>
+            </a:fontRef>
+          </p:style>
+          <p:txBody>
+            <a:bodyPr rtlCol="0" anchor="ctr"/>
+            <a:lstStyle/>
+            <a:p>
+              <a:pPr algn="ctr"/>
+              <a:endParaRPr lang="en-US"/>
+            </a:p>
+          </p:txBody>
+        </p:sp>
+        <p:sp>
+          <p:nvSpPr>
+            <p:cNvPr id="41" name="Oval 40">
+              <a:extLst>
+                <a:ext uri="{FF2B5EF4-FFF2-40B4-BE49-F238E27FC236}">
+                  <a16:creationId xmlns:a16="http://schemas.microsoft.com/office/drawing/2014/main" id="{911B8BB5-FC77-1C4A-8358-DD1E418F100B}"/>
+                </a:ext>
+              </a:extLst>
+            </p:cNvPr>
+            <p:cNvSpPr/>
+            <p:nvPr/>
+          </p:nvSpPr>
+          <p:spPr>
+            <a:xfrm>
+              <a:off x="5885018" y="5678478"/>
+              <a:ext cx="374058" cy="374904"/>
+            </a:xfrm>
+            <a:prstGeom prst="ellipse">
+              <a:avLst/>
+            </a:prstGeom>
+            <a:grpFill/>
+          </p:spPr>
+          <p:style>
+            <a:lnRef idx="2">
+              <a:schemeClr val="accent1">
+                <a:shade val="50000"/>
+              </a:schemeClr>
+            </a:lnRef>
+            <a:fillRef idx="1">
+              <a:schemeClr val="accent1"/>
+            </a:fillRef>
+            <a:effectRef idx="0">
+              <a:schemeClr val="accent1"/>
+            </a:effectRef>
+            <a:fontRef idx="minor">
+              <a:schemeClr val="lt1"/>
+            </a:fontRef>
+          </p:style>
+          <p:txBody>
+            <a:bodyPr rtlCol="0" anchor="ctr"/>
+            <a:lstStyle/>
+            <a:p>
+              <a:pPr algn="ctr"/>
+              <a:endParaRPr lang="en-US"/>
+            </a:p>
+          </p:txBody>
+        </p:sp>
+        <p:sp>
+          <p:nvSpPr>
+            <p:cNvPr id="42" name="Oval 41">
+              <a:extLst>
+                <a:ext uri="{FF2B5EF4-FFF2-40B4-BE49-F238E27FC236}">
+                  <a16:creationId xmlns:a16="http://schemas.microsoft.com/office/drawing/2014/main" id="{3F89176F-BAB0-964D-84AF-6F7A3C9A2DE6}"/>
+                </a:ext>
+              </a:extLst>
+            </p:cNvPr>
+            <p:cNvSpPr/>
+            <p:nvPr/>
+          </p:nvSpPr>
+          <p:spPr>
+            <a:xfrm>
+              <a:off x="6552830" y="5672267"/>
+              <a:ext cx="374058" cy="374904"/>
+            </a:xfrm>
+            <a:prstGeom prst="ellipse">
+              <a:avLst/>
+            </a:prstGeom>
+            <a:grpFill/>
+          </p:spPr>
+          <p:style>
+            <a:lnRef idx="2">
+              <a:schemeClr val="accent1">
+                <a:shade val="50000"/>
+              </a:schemeClr>
+            </a:lnRef>
+            <a:fillRef idx="1">
+              <a:schemeClr val="accent1"/>
+            </a:fillRef>
+            <a:effectRef idx="0">
+              <a:schemeClr val="accent1"/>
+            </a:effectRef>
+            <a:fontRef idx="minor">
+              <a:schemeClr val="lt1"/>
+            </a:fontRef>
+          </p:style>
+          <p:txBody>
+            <a:bodyPr rtlCol="0" anchor="ctr"/>
+            <a:lstStyle/>
+            <a:p>
+              <a:pPr algn="ctr"/>
+              <a:endParaRPr lang="en-US"/>
+            </a:p>
+          </p:txBody>
+        </p:sp>
+        <p:sp>
+          <p:nvSpPr>
+            <p:cNvPr id="43" name="Oval 42">
+              <a:extLst>
+                <a:ext uri="{FF2B5EF4-FFF2-40B4-BE49-F238E27FC236}">
+                  <a16:creationId xmlns:a16="http://schemas.microsoft.com/office/drawing/2014/main" id="{0057290F-2846-CE48-821E-17952CE8538B}"/>
+                </a:ext>
+              </a:extLst>
+            </p:cNvPr>
+            <p:cNvSpPr/>
+            <p:nvPr/>
+          </p:nvSpPr>
+          <p:spPr>
+            <a:xfrm>
+              <a:off x="7216824" y="5679538"/>
+              <a:ext cx="374058" cy="374904"/>
+            </a:xfrm>
+            <a:prstGeom prst="ellipse">
+              <a:avLst/>
+            </a:prstGeom>
+            <a:grpFill/>
+          </p:spPr>
+          <p:style>
+            <a:lnRef idx="2">
+              <a:schemeClr val="accent1">
+                <a:shade val="50000"/>
+              </a:schemeClr>
+            </a:lnRef>
+            <a:fillRef idx="1">
+              <a:schemeClr val="accent1"/>
+            </a:fillRef>
+            <a:effectRef idx="0">
+              <a:schemeClr val="accent1"/>
+            </a:effectRef>
+            <a:fontRef idx="minor">
+              <a:schemeClr val="lt1"/>
+            </a:fontRef>
+          </p:style>
+          <p:txBody>
+            <a:bodyPr rtlCol="0" anchor="ctr"/>
+            <a:lstStyle/>
+            <a:p>
+              <a:pPr algn="ctr"/>
+              <a:endParaRPr lang="en-US"/>
+            </a:p>
+          </p:txBody>
+        </p:sp>
+        <p:sp>
+          <p:nvSpPr>
+            <p:cNvPr id="44" name="Oval 43">
+              <a:extLst>
+                <a:ext uri="{FF2B5EF4-FFF2-40B4-BE49-F238E27FC236}">
+                  <a16:creationId xmlns:a16="http://schemas.microsoft.com/office/drawing/2014/main" id="{7E4D141A-7746-A74D-9CBC-B45E85488FBB}"/>
+                </a:ext>
+              </a:extLst>
+            </p:cNvPr>
+            <p:cNvSpPr/>
+            <p:nvPr/>
+          </p:nvSpPr>
+          <p:spPr>
+            <a:xfrm>
+              <a:off x="7885348" y="5672267"/>
+              <a:ext cx="374058" cy="374904"/>
+            </a:xfrm>
+            <a:prstGeom prst="ellipse">
+              <a:avLst/>
+            </a:prstGeom>
+            <a:grpFill/>
+          </p:spPr>
+          <p:style>
+            <a:lnRef idx="2">
+              <a:schemeClr val="accent1">
+                <a:shade val="50000"/>
+              </a:schemeClr>
+            </a:lnRef>
+            <a:fillRef idx="1">
+              <a:schemeClr val="accent1"/>
+            </a:fillRef>
+            <a:effectRef idx="0">
+              <a:schemeClr val="accent1"/>
+            </a:effectRef>
+            <a:fontRef idx="minor">
+              <a:schemeClr val="lt1"/>
+            </a:fontRef>
+          </p:style>
+          <p:txBody>
+            <a:bodyPr rtlCol="0" anchor="ctr"/>
+            <a:lstStyle/>
+            <a:p>
+              <a:pPr algn="ctr"/>
+              <a:endParaRPr lang="en-US"/>
+            </a:p>
+          </p:txBody>
+        </p:sp>
+      </p:grpSp>
+      <p:cxnSp>
+        <p:nvCxnSpPr>
+          <p:cNvPr id="4" name="Straight Connector 3">
+            <a:extLst>
+              <a:ext uri="{FF2B5EF4-FFF2-40B4-BE49-F238E27FC236}">
+                <a16:creationId xmlns:a16="http://schemas.microsoft.com/office/drawing/2014/main" id="{B5F6C9A2-E96F-CE4D-9D09-7D532C1F0550}"/>
+              </a:ext>
+            </a:extLst>
+          </p:cNvPr>
+          <p:cNvCxnSpPr/>
+          <p:nvPr/>
+        </p:nvCxnSpPr>
+        <p:spPr>
+          <a:xfrm>
+            <a:off x="4730242" y="451993"/>
+            <a:ext cx="4930968" cy="6243638"/>
+          </a:xfrm>
+          <a:prstGeom prst="line">
+            <a:avLst/>
+          </a:prstGeom>
+          <a:ln>
+            <a:solidFill>
+              <a:schemeClr val="tx1"/>
+            </a:solidFill>
+          </a:ln>
+        </p:spPr>
+        <p:style>
+          <a:lnRef idx="1">
+            <a:schemeClr val="accent1"/>
+          </a:lnRef>
+          <a:fillRef idx="0">
+            <a:schemeClr val="accent1"/>
+          </a:fillRef>
+          <a:effectRef idx="0">
+            <a:schemeClr val="accent1"/>
+          </a:effectRef>
+          <a:fontRef idx="minor">
+            <a:schemeClr val="tx1"/>
+          </a:fontRef>
+        </p:style>
+      </p:cxnSp>
+      <p:sp>
+        <p:nvSpPr>
+          <p:cNvPr id="12" name="TextBox 11">
+            <a:extLst>
+              <a:ext uri="{FF2B5EF4-FFF2-40B4-BE49-F238E27FC236}">
+                <a16:creationId xmlns:a16="http://schemas.microsoft.com/office/drawing/2014/main" id="{BC3D5A27-1B66-7842-A433-D58063EC55A1}"/>
+              </a:ext>
+            </a:extLst>
+          </p:cNvPr>
+          <p:cNvSpPr txBox="1"/>
+          <p:nvPr/>
+        </p:nvSpPr>
+        <p:spPr>
+          <a:xfrm>
+            <a:off x="797275" y="155950"/>
+            <a:ext cx="3102348" cy="523220"/>
+          </a:xfrm>
+          <a:prstGeom prst="rect">
+            <a:avLst/>
+          </a:prstGeom>
+          <a:noFill/>
+        </p:spPr>
+        <p:txBody>
+          <a:bodyPr wrap="square" rtlCol="0">
+            <a:spAutoFit/>
+          </a:bodyPr>
+          <a:lstStyle/>
+          <a:p>
+            <a:pPr algn="ctr"/>
+            <a:r>
+              <a:rPr lang="en-US" sz="2800" b="1" dirty="0"/>
+              <a:t>Familiarization</a:t>
+            </a:r>
+          </a:p>
+        </p:txBody>
+      </p:sp>
+      <p:sp>
+        <p:nvSpPr>
+          <p:cNvPr id="47" name="TextBox 46">
+            <a:extLst>
+              <a:ext uri="{FF2B5EF4-FFF2-40B4-BE49-F238E27FC236}">
+                <a16:creationId xmlns:a16="http://schemas.microsoft.com/office/drawing/2014/main" id="{A17B9325-24EB-BE45-8B08-612FE65F8FDD}"/>
+              </a:ext>
+            </a:extLst>
+          </p:cNvPr>
+          <p:cNvSpPr txBox="1"/>
+          <p:nvPr/>
+        </p:nvSpPr>
+        <p:spPr>
+          <a:xfrm>
+            <a:off x="7250663" y="112716"/>
+            <a:ext cx="3102348" cy="523220"/>
+          </a:xfrm>
+          <a:prstGeom prst="rect">
+            <a:avLst/>
+          </a:prstGeom>
+          <a:noFill/>
+        </p:spPr>
+        <p:txBody>
+          <a:bodyPr wrap="square" rtlCol="0">
+            <a:spAutoFit/>
+          </a:bodyPr>
+          <a:lstStyle/>
+          <a:p>
+            <a:pPr algn="ctr"/>
+            <a:r>
+              <a:rPr lang="en-US" sz="2800" b="1" dirty="0"/>
+              <a:t>Test</a:t>
+            </a:r>
+          </a:p>
+        </p:txBody>
+      </p:sp>
+      <p:sp>
+        <p:nvSpPr>
+          <p:cNvPr id="13" name="TextBox 12">
+            <a:extLst>
+              <a:ext uri="{FF2B5EF4-FFF2-40B4-BE49-F238E27FC236}">
+                <a16:creationId xmlns:a16="http://schemas.microsoft.com/office/drawing/2014/main" id="{EABC039B-4A96-7C45-91E5-19225913035C}"/>
+              </a:ext>
+            </a:extLst>
+          </p:cNvPr>
+          <p:cNvSpPr txBox="1"/>
+          <p:nvPr/>
+        </p:nvSpPr>
+        <p:spPr>
+          <a:xfrm>
+            <a:off x="6511683" y="2376596"/>
+            <a:ext cx="2268810" cy="369332"/>
+          </a:xfrm>
+          <a:prstGeom prst="rect">
+            <a:avLst/>
+          </a:prstGeom>
+          <a:noFill/>
+        </p:spPr>
+        <p:txBody>
+          <a:bodyPr wrap="square" rtlCol="0">
+            <a:spAutoFit/>
+          </a:bodyPr>
+          <a:lstStyle/>
+          <a:p>
+            <a:r>
+              <a:rPr lang="en-US" dirty="0"/>
+              <a:t>deviant</a:t>
+            </a:r>
+          </a:p>
+        </p:txBody>
+      </p:sp>
+      <p:sp>
+        <p:nvSpPr>
+          <p:cNvPr id="49" name="TextBox 48">
+            <a:extLst>
+              <a:ext uri="{FF2B5EF4-FFF2-40B4-BE49-F238E27FC236}">
+                <a16:creationId xmlns:a16="http://schemas.microsoft.com/office/drawing/2014/main" id="{8BE2E4EA-7A58-E74E-ADD5-63F25C09B87E}"/>
+              </a:ext>
+            </a:extLst>
+          </p:cNvPr>
+          <p:cNvSpPr txBox="1"/>
+          <p:nvPr/>
+        </p:nvSpPr>
+        <p:spPr>
+          <a:xfrm>
+            <a:off x="6085287" y="951185"/>
+            <a:ext cx="2268810" cy="369332"/>
+          </a:xfrm>
+          <a:prstGeom prst="rect">
+            <a:avLst/>
+          </a:prstGeom>
+          <a:noFill/>
+        </p:spPr>
+        <p:txBody>
+          <a:bodyPr wrap="square" rtlCol="0">
+            <a:spAutoFit/>
+          </a:bodyPr>
+          <a:lstStyle/>
+          <a:p>
+            <a:r>
+              <a:rPr lang="en-US" dirty="0"/>
+              <a:t>background</a:t>
+            </a:r>
+          </a:p>
+        </p:txBody>
+      </p:sp>
+      <p:sp>
+        <p:nvSpPr>
+          <p:cNvPr id="50" name="TextBox 49">
+            <a:extLst>
+              <a:ext uri="{FF2B5EF4-FFF2-40B4-BE49-F238E27FC236}">
+                <a16:creationId xmlns:a16="http://schemas.microsoft.com/office/drawing/2014/main" id="{8593CC23-7BF4-8545-A5E0-B3824F4060E0}"/>
+              </a:ext>
+            </a:extLst>
+          </p:cNvPr>
+          <p:cNvSpPr txBox="1"/>
+          <p:nvPr/>
+        </p:nvSpPr>
+        <p:spPr>
+          <a:xfrm>
+            <a:off x="8001546" y="4184431"/>
+            <a:ext cx="2268810" cy="369332"/>
+          </a:xfrm>
+          <a:prstGeom prst="rect">
+            <a:avLst/>
+          </a:prstGeom>
+          <a:noFill/>
+        </p:spPr>
+        <p:txBody>
+          <a:bodyPr wrap="square" rtlCol="0">
+            <a:spAutoFit/>
+          </a:bodyPr>
+          <a:lstStyle/>
+          <a:p>
+            <a:r>
+              <a:rPr lang="en-US" dirty="0"/>
+              <a:t>deviant</a:t>
+            </a:r>
+          </a:p>
+        </p:txBody>
+      </p:sp>
+      <p:sp>
+        <p:nvSpPr>
+          <p:cNvPr id="51" name="TextBox 50">
+            <a:extLst>
+              <a:ext uri="{FF2B5EF4-FFF2-40B4-BE49-F238E27FC236}">
+                <a16:creationId xmlns:a16="http://schemas.microsoft.com/office/drawing/2014/main" id="{61478043-D398-884D-9C4D-2440905FC377}"/>
+              </a:ext>
+            </a:extLst>
+          </p:cNvPr>
+          <p:cNvSpPr txBox="1"/>
+          <p:nvPr/>
+        </p:nvSpPr>
+        <p:spPr>
+          <a:xfrm>
+            <a:off x="7586468" y="2853994"/>
+            <a:ext cx="2268810" cy="369332"/>
+          </a:xfrm>
+          <a:prstGeom prst="rect">
+            <a:avLst/>
+          </a:prstGeom>
+          <a:noFill/>
+        </p:spPr>
+        <p:txBody>
+          <a:bodyPr wrap="square" rtlCol="0">
+            <a:spAutoFit/>
+          </a:bodyPr>
+          <a:lstStyle/>
+          <a:p>
+            <a:r>
+              <a:rPr lang="en-US" dirty="0"/>
+              <a:t>background</a:t>
+            </a:r>
+          </a:p>
+        </p:txBody>
+      </p:sp>
+      <p:sp>
+        <p:nvSpPr>
+          <p:cNvPr id="52" name="TextBox 51">
+            <a:extLst>
+              <a:ext uri="{FF2B5EF4-FFF2-40B4-BE49-F238E27FC236}">
+                <a16:creationId xmlns:a16="http://schemas.microsoft.com/office/drawing/2014/main" id="{92E5CACF-1B25-8342-A5A1-4F678E0BAB2F}"/>
+              </a:ext>
+            </a:extLst>
+          </p:cNvPr>
+          <p:cNvSpPr txBox="1"/>
+          <p:nvPr/>
+        </p:nvSpPr>
+        <p:spPr>
+          <a:xfrm>
+            <a:off x="9370138" y="6144419"/>
+            <a:ext cx="996760" cy="369332"/>
+          </a:xfrm>
+          <a:prstGeom prst="rect">
+            <a:avLst/>
+          </a:prstGeom>
+          <a:noFill/>
+        </p:spPr>
+        <p:txBody>
+          <a:bodyPr wrap="square" rtlCol="0">
+            <a:spAutoFit/>
+          </a:bodyPr>
+          <a:lstStyle/>
+          <a:p>
+            <a:r>
+              <a:rPr lang="en-US" dirty="0"/>
+              <a:t>deviant</a:t>
+            </a:r>
+          </a:p>
+        </p:txBody>
+      </p:sp>
+      <p:sp>
+        <p:nvSpPr>
+          <p:cNvPr id="53" name="TextBox 52">
+            <a:extLst>
+              <a:ext uri="{FF2B5EF4-FFF2-40B4-BE49-F238E27FC236}">
+                <a16:creationId xmlns:a16="http://schemas.microsoft.com/office/drawing/2014/main" id="{8A7A68E0-FF15-2248-9382-18238076CA54}"/>
+              </a:ext>
+            </a:extLst>
+          </p:cNvPr>
+          <p:cNvSpPr txBox="1"/>
+          <p:nvPr/>
+        </p:nvSpPr>
+        <p:spPr>
+          <a:xfrm>
+            <a:off x="8792429" y="4965951"/>
+            <a:ext cx="2268810" cy="369332"/>
+          </a:xfrm>
+          <a:prstGeom prst="rect">
+            <a:avLst/>
+          </a:prstGeom>
+          <a:noFill/>
+        </p:spPr>
+        <p:txBody>
+          <a:bodyPr wrap="square" rtlCol="0">
+            <a:spAutoFit/>
+          </a:bodyPr>
+          <a:lstStyle/>
+          <a:p>
+            <a:r>
+              <a:rPr lang="en-US" dirty="0"/>
+              <a:t>background</a:t>
+            </a:r>
+          </a:p>
+        </p:txBody>
+      </p:sp>
+      <p:sp>
+        <p:nvSpPr>
+          <p:cNvPr id="60" name="Oval 59">
+            <a:extLst>
+              <a:ext uri="{FF2B5EF4-FFF2-40B4-BE49-F238E27FC236}">
+                <a16:creationId xmlns:a16="http://schemas.microsoft.com/office/drawing/2014/main" id="{1323B5B4-A87F-3E4F-9108-607122DBD53C}"/>
+              </a:ext>
+            </a:extLst>
+          </p:cNvPr>
+          <p:cNvSpPr/>
+          <p:nvPr/>
+        </p:nvSpPr>
+        <p:spPr>
+          <a:xfrm>
+            <a:off x="7521290" y="1004142"/>
+            <a:ext cx="374058" cy="374904"/>
+          </a:xfrm>
+          <a:prstGeom prst="ellipse">
+            <a:avLst/>
+          </a:prstGeom>
+          <a:solidFill>
+            <a:schemeClr val="tx1">
+              <a:lumMod val="85000"/>
+              <a:lumOff val="15000"/>
+            </a:schemeClr>
+          </a:solidFill>
+        </p:spPr>
+        <p:style>
+          <a:lnRef idx="2">
+            <a:schemeClr val="accent1">
+              <a:shade val="50000"/>
+            </a:schemeClr>
+          </a:lnRef>
+          <a:fillRef idx="1">
+            <a:schemeClr val="accent1"/>
+          </a:fillRef>
+          <a:effectRef idx="0">
+            <a:schemeClr val="accent1"/>
+          </a:effectRef>
+          <a:fontRef idx="minor">
+            <a:schemeClr val="lt1"/>
+          </a:fontRef>
+        </p:style>
+        <p:txBody>
+          <a:bodyPr rtlCol="0" anchor="ctr"/>
+          <a:lstStyle/>
+          <a:p>
+            <a:pPr algn="ctr"/>
+            <a:endParaRPr lang="en-US"/>
+          </a:p>
+        </p:txBody>
+      </p:sp>
+      <p:sp>
+        <p:nvSpPr>
+          <p:cNvPr id="48" name="Oval 47">
+            <a:extLst>
+              <a:ext uri="{FF2B5EF4-FFF2-40B4-BE49-F238E27FC236}">
+                <a16:creationId xmlns:a16="http://schemas.microsoft.com/office/drawing/2014/main" id="{4F243A05-6337-1A4E-8814-D9C7FEF70B2D}"/>
+              </a:ext>
+            </a:extLst>
+          </p:cNvPr>
+          <p:cNvSpPr/>
+          <p:nvPr/>
+        </p:nvSpPr>
+        <p:spPr>
+          <a:xfrm>
+            <a:off x="7570569" y="2261333"/>
+            <a:ext cx="374058" cy="374904"/>
+          </a:xfrm>
+          <a:prstGeom prst="ellipse">
+            <a:avLst/>
+          </a:prstGeom>
+          <a:solidFill>
+            <a:srgbClr val="FF0000"/>
+          </a:solidFill>
+        </p:spPr>
+        <p:style>
+          <a:lnRef idx="2">
+            <a:schemeClr val="accent1">
+              <a:shade val="50000"/>
+            </a:schemeClr>
+          </a:lnRef>
+          <a:fillRef idx="1">
+            <a:schemeClr val="accent1"/>
+          </a:fillRef>
+          <a:effectRef idx="0">
+            <a:schemeClr val="accent1"/>
+          </a:effectRef>
+          <a:fontRef idx="minor">
+            <a:schemeClr val="lt1"/>
+          </a:fontRef>
+        </p:style>
+        <p:txBody>
+          <a:bodyPr rtlCol="0" anchor="ctr"/>
+          <a:lstStyle/>
+          <a:p>
+            <a:pPr algn="ctr"/>
+            <a:endParaRPr lang="en-US"/>
+          </a:p>
+        </p:txBody>
+      </p:sp>
+      <p:sp>
+        <p:nvSpPr>
+          <p:cNvPr id="55" name="Oval 54">
+            <a:extLst>
+              <a:ext uri="{FF2B5EF4-FFF2-40B4-BE49-F238E27FC236}">
+                <a16:creationId xmlns:a16="http://schemas.microsoft.com/office/drawing/2014/main" id="{F00457AA-A3EE-544C-B945-65329DC04DC8}"/>
+              </a:ext>
+            </a:extLst>
+          </p:cNvPr>
+          <p:cNvSpPr/>
+          <p:nvPr/>
+        </p:nvSpPr>
+        <p:spPr>
+          <a:xfrm>
+            <a:off x="9160153" y="2840422"/>
+            <a:ext cx="374058" cy="374904"/>
+          </a:xfrm>
+          <a:prstGeom prst="ellipse">
+            <a:avLst/>
+          </a:prstGeom>
+          <a:solidFill>
+            <a:schemeClr val="tx1">
+              <a:lumMod val="85000"/>
+              <a:lumOff val="15000"/>
+            </a:schemeClr>
+          </a:solidFill>
+        </p:spPr>
+        <p:style>
+          <a:lnRef idx="2">
+            <a:schemeClr val="accent1">
+              <a:shade val="50000"/>
+            </a:schemeClr>
+          </a:lnRef>
+          <a:fillRef idx="1">
+            <a:schemeClr val="accent1"/>
+          </a:fillRef>
+          <a:effectRef idx="0">
+            <a:schemeClr val="accent1"/>
+          </a:effectRef>
+          <a:fontRef idx="minor">
+            <a:schemeClr val="lt1"/>
+          </a:fontRef>
+        </p:style>
+        <p:txBody>
+          <a:bodyPr rtlCol="0" anchor="ctr"/>
+          <a:lstStyle/>
+          <a:p>
+            <a:pPr algn="ctr"/>
+            <a:endParaRPr lang="en-US"/>
+          </a:p>
+        </p:txBody>
+      </p:sp>
+      <p:sp>
+        <p:nvSpPr>
+          <p:cNvPr id="56" name="Oval 55">
+            <a:extLst>
+              <a:ext uri="{FF2B5EF4-FFF2-40B4-BE49-F238E27FC236}">
+                <a16:creationId xmlns:a16="http://schemas.microsoft.com/office/drawing/2014/main" id="{72FE710F-3B1B-2640-AF2F-4208FDB4313E}"/>
+              </a:ext>
+            </a:extLst>
+          </p:cNvPr>
+          <p:cNvSpPr/>
+          <p:nvPr/>
+        </p:nvSpPr>
+        <p:spPr>
+          <a:xfrm>
+            <a:off x="9209432" y="4097613"/>
+            <a:ext cx="374058" cy="374904"/>
+          </a:xfrm>
+          <a:prstGeom prst="ellipse">
+            <a:avLst/>
+          </a:prstGeom>
+          <a:solidFill>
+            <a:srgbClr val="FF0000"/>
+          </a:solidFill>
+        </p:spPr>
+        <p:style>
+          <a:lnRef idx="2">
+            <a:schemeClr val="accent1">
+              <a:shade val="50000"/>
+            </a:schemeClr>
+          </a:lnRef>
+          <a:fillRef idx="1">
+            <a:schemeClr val="accent1"/>
+          </a:fillRef>
+          <a:effectRef idx="0">
+            <a:schemeClr val="accent1"/>
+          </a:effectRef>
+          <a:fontRef idx="minor">
+            <a:schemeClr val="lt1"/>
+          </a:fontRef>
+        </p:style>
+        <p:txBody>
+          <a:bodyPr rtlCol="0" anchor="ctr"/>
+          <a:lstStyle/>
+          <a:p>
+            <a:pPr algn="ctr"/>
+            <a:endParaRPr lang="en-US"/>
+          </a:p>
+        </p:txBody>
+      </p:sp>
+      <p:sp>
+        <p:nvSpPr>
+          <p:cNvPr id="61" name="Oval 60">
+            <a:extLst>
+              <a:ext uri="{FF2B5EF4-FFF2-40B4-BE49-F238E27FC236}">
+                <a16:creationId xmlns:a16="http://schemas.microsoft.com/office/drawing/2014/main" id="{6F12910B-1B4D-784B-824E-4986DB9C0705}"/>
+              </a:ext>
+            </a:extLst>
+          </p:cNvPr>
+          <p:cNvSpPr/>
+          <p:nvPr/>
+        </p:nvSpPr>
+        <p:spPr>
+          <a:xfrm>
+            <a:off x="10684215" y="4885898"/>
+            <a:ext cx="374058" cy="374904"/>
+          </a:xfrm>
+          <a:prstGeom prst="ellipse">
+            <a:avLst/>
+          </a:prstGeom>
+          <a:solidFill>
+            <a:schemeClr val="tx1">
+              <a:lumMod val="85000"/>
+              <a:lumOff val="15000"/>
+            </a:schemeClr>
+          </a:solidFill>
+        </p:spPr>
+        <p:style>
+          <a:lnRef idx="2">
+            <a:schemeClr val="accent1">
+              <a:shade val="50000"/>
+            </a:schemeClr>
+          </a:lnRef>
+          <a:fillRef idx="1">
+            <a:schemeClr val="accent1"/>
+          </a:fillRef>
+          <a:effectRef idx="0">
+            <a:schemeClr val="accent1"/>
+          </a:effectRef>
+          <a:fontRef idx="minor">
+            <a:schemeClr val="lt1"/>
+          </a:fontRef>
+        </p:style>
+        <p:txBody>
+          <a:bodyPr rtlCol="0" anchor="ctr"/>
+          <a:lstStyle/>
+          <a:p>
+            <a:pPr algn="ctr"/>
+            <a:endParaRPr lang="en-US"/>
+          </a:p>
+        </p:txBody>
+      </p:sp>
+      <p:sp>
+        <p:nvSpPr>
+          <p:cNvPr id="62" name="Oval 61">
+            <a:extLst>
+              <a:ext uri="{FF2B5EF4-FFF2-40B4-BE49-F238E27FC236}">
+                <a16:creationId xmlns:a16="http://schemas.microsoft.com/office/drawing/2014/main" id="{ED0A7844-D8FF-6947-97C0-6177F933DD1B}"/>
+              </a:ext>
+            </a:extLst>
+          </p:cNvPr>
+          <p:cNvSpPr/>
+          <p:nvPr/>
+        </p:nvSpPr>
+        <p:spPr>
+          <a:xfrm>
+            <a:off x="10733494" y="6143089"/>
+            <a:ext cx="374058" cy="374904"/>
+          </a:xfrm>
+          <a:prstGeom prst="ellipse">
+            <a:avLst/>
+          </a:prstGeom>
+          <a:solidFill>
+            <a:srgbClr val="FF0000"/>
+          </a:solidFill>
+        </p:spPr>
+        <p:style>
+          <a:lnRef idx="2">
+            <a:schemeClr val="accent1">
+              <a:shade val="50000"/>
+            </a:schemeClr>
+          </a:lnRef>
+          <a:fillRef idx="1">
+            <a:schemeClr val="accent1"/>
+          </a:fillRef>
+          <a:effectRef idx="0">
+            <a:schemeClr val="accent1"/>
+          </a:effectRef>
+          <a:fontRef idx="minor">
+            <a:schemeClr val="lt1"/>
+          </a:fontRef>
+        </p:style>
+        <p:txBody>
+          <a:bodyPr rtlCol="0" anchor="ctr"/>
+          <a:lstStyle/>
+          <a:p>
+            <a:pPr algn="ctr"/>
+            <a:endParaRPr lang="en-US"/>
+          </a:p>
+        </p:txBody>
+      </p:sp>
+      <p:pic>
+        <p:nvPicPr>
+          <p:cNvPr id="69" name="Picture 68" descr="A picture containing text, outdoor object&#10;&#10;Description automatically generated">
+            <a:extLst>
+              <a:ext uri="{FF2B5EF4-FFF2-40B4-BE49-F238E27FC236}">
+                <a16:creationId xmlns:a16="http://schemas.microsoft.com/office/drawing/2014/main" id="{2986E9C6-B40F-B44B-8D2C-C79BA1A76AAA}"/>
+              </a:ext>
+            </a:extLst>
+          </p:cNvPr>
+          <p:cNvPicPr>
+            <a:picLocks noChangeAspect="1"/>
+          </p:cNvPicPr>
+          <p:nvPr/>
+        </p:nvPicPr>
+        <p:blipFill>
+          <a:blip r:embed="rId4"/>
+          <a:stretch>
+            <a:fillRect/>
+          </a:stretch>
+        </p:blipFill>
+        <p:spPr>
+          <a:xfrm>
+            <a:off x="19104066" y="4634105"/>
+            <a:ext cx="1651000" cy="1536700"/>
+          </a:xfrm>
+          <a:prstGeom prst="rect">
+            <a:avLst/>
+          </a:prstGeom>
+        </p:spPr>
+      </p:pic>
+      <p:sp>
+        <p:nvSpPr>
+          <p:cNvPr id="3" name="Oval 2">
+            <a:extLst>
+              <a:ext uri="{FF2B5EF4-FFF2-40B4-BE49-F238E27FC236}">
+                <a16:creationId xmlns:a16="http://schemas.microsoft.com/office/drawing/2014/main" id="{64E87024-AE7E-E647-9199-681F423286A1}"/>
+              </a:ext>
+            </a:extLst>
+          </p:cNvPr>
+          <p:cNvSpPr/>
+          <p:nvPr/>
+        </p:nvSpPr>
+        <p:spPr>
+          <a:xfrm>
+            <a:off x="7729395" y="5679538"/>
+            <a:ext cx="374058" cy="374904"/>
+          </a:xfrm>
+          <a:prstGeom prst="ellipse">
+            <a:avLst/>
+          </a:prstGeom>
+          <a:solidFill>
+            <a:schemeClr val="tx1">
+              <a:lumMod val="85000"/>
+              <a:lumOff val="15000"/>
+            </a:schemeClr>
+          </a:solidFill>
+        </p:spPr>
+        <p:style>
+          <a:lnRef idx="2">
+            <a:schemeClr val="accent1">
+              <a:shade val="50000"/>
+            </a:schemeClr>
+          </a:lnRef>
+          <a:fillRef idx="1">
+            <a:schemeClr val="accent1"/>
+          </a:fillRef>
+          <a:effectRef idx="0">
+            <a:schemeClr val="accent1"/>
+          </a:effectRef>
+          <a:fontRef idx="minor">
+            <a:schemeClr val="lt1"/>
+          </a:fontRef>
+        </p:style>
+        <p:txBody>
+          <a:bodyPr rtlCol="0" anchor="ctr"/>
+          <a:lstStyle/>
+          <a:p>
+            <a:pPr algn="ctr"/>
+            <a:endParaRPr lang="en-US"/>
+          </a:p>
+        </p:txBody>
+      </p:sp>
+      <p:sp>
+        <p:nvSpPr>
+          <p:cNvPr id="8" name="Oval 7">
+            <a:extLst>
+              <a:ext uri="{FF2B5EF4-FFF2-40B4-BE49-F238E27FC236}">
+                <a16:creationId xmlns:a16="http://schemas.microsoft.com/office/drawing/2014/main" id="{4CA2FAB1-DC5F-86CD-9E88-D291E6A87C8C}"/>
+              </a:ext>
+            </a:extLst>
+          </p:cNvPr>
+          <p:cNvSpPr/>
+          <p:nvPr/>
+        </p:nvSpPr>
+        <p:spPr>
+          <a:xfrm>
+            <a:off x="8397919" y="5672267"/>
+            <a:ext cx="374058" cy="374904"/>
+          </a:xfrm>
+          <a:prstGeom prst="ellipse">
+            <a:avLst/>
+          </a:prstGeom>
+          <a:solidFill>
+            <a:schemeClr val="tx1">
+              <a:lumMod val="85000"/>
+              <a:lumOff val="15000"/>
+            </a:schemeClr>
+          </a:solidFill>
+        </p:spPr>
+        <p:style>
+          <a:lnRef idx="2">
+            <a:schemeClr val="accent1">
+              <a:shade val="50000"/>
+            </a:schemeClr>
+          </a:lnRef>
+          <a:fillRef idx="1">
+            <a:schemeClr val="accent1"/>
+          </a:fillRef>
+          <a:effectRef idx="0">
+            <a:schemeClr val="accent1"/>
+          </a:effectRef>
+          <a:fontRef idx="minor">
+            <a:schemeClr val="lt1"/>
+          </a:fontRef>
+        </p:style>
+        <p:txBody>
+          <a:bodyPr rtlCol="0" anchor="ctr"/>
+          <a:lstStyle/>
+          <a:p>
+            <a:pPr algn="ctr"/>
+            <a:endParaRPr lang="en-US"/>
+          </a:p>
+        </p:txBody>
+      </p:sp>
+      <p:pic>
+        <p:nvPicPr>
+          <p:cNvPr id="11" name="Picture 10">
+            <a:extLst>
+              <a:ext uri="{FF2B5EF4-FFF2-40B4-BE49-F238E27FC236}">
+                <a16:creationId xmlns:a16="http://schemas.microsoft.com/office/drawing/2014/main" id="{922211D6-A435-1E1E-9EB3-5893387FDF74}"/>
+              </a:ext>
+            </a:extLst>
+          </p:cNvPr>
+          <p:cNvPicPr>
+            <a:picLocks noChangeAspect="1"/>
+          </p:cNvPicPr>
+          <p:nvPr/>
+        </p:nvPicPr>
+        <p:blipFill>
+          <a:blip r:embed="rId5"/>
+          <a:stretch>
+            <a:fillRect/>
+          </a:stretch>
+        </p:blipFill>
+        <p:spPr>
+          <a:xfrm>
+            <a:off x="2831895" y="1434139"/>
+            <a:ext cx="1015429" cy="883673"/>
+          </a:xfrm>
+          <a:prstGeom prst="rect">
+            <a:avLst/>
+          </a:prstGeom>
+        </p:spPr>
+      </p:pic>
+      <p:pic>
+        <p:nvPicPr>
+          <p:cNvPr id="14" name="Picture 13">
+            <a:extLst>
+              <a:ext uri="{FF2B5EF4-FFF2-40B4-BE49-F238E27FC236}">
+                <a16:creationId xmlns:a16="http://schemas.microsoft.com/office/drawing/2014/main" id="{DF087F7D-D6F6-13E1-5900-522D9091F0C1}"/>
+              </a:ext>
+            </a:extLst>
+          </p:cNvPr>
+          <p:cNvPicPr>
+            <a:picLocks noChangeAspect="1"/>
+          </p:cNvPicPr>
+          <p:nvPr/>
+        </p:nvPicPr>
+        <p:blipFill>
+          <a:blip r:embed="rId5"/>
+          <a:stretch>
+            <a:fillRect/>
+          </a:stretch>
+        </p:blipFill>
+        <p:spPr>
+          <a:xfrm>
+            <a:off x="7955300" y="678485"/>
+            <a:ext cx="1015429" cy="883673"/>
+          </a:xfrm>
+          <a:prstGeom prst="rect">
+            <a:avLst/>
+          </a:prstGeom>
+        </p:spPr>
+      </p:pic>
+      <p:pic>
+        <p:nvPicPr>
+          <p:cNvPr id="16" name="Picture 15">
+            <a:extLst>
+              <a:ext uri="{FF2B5EF4-FFF2-40B4-BE49-F238E27FC236}">
+                <a16:creationId xmlns:a16="http://schemas.microsoft.com/office/drawing/2014/main" id="{7F829354-C45D-1D0C-9DC2-B79AE61741E5}"/>
+              </a:ext>
+            </a:extLst>
+          </p:cNvPr>
+          <p:cNvPicPr>
+            <a:picLocks noChangeAspect="1"/>
+          </p:cNvPicPr>
+          <p:nvPr/>
+        </p:nvPicPr>
+        <p:blipFill>
+          <a:blip r:embed="rId6"/>
+          <a:stretch>
+            <a:fillRect/>
+          </a:stretch>
+        </p:blipFill>
+        <p:spPr>
+          <a:xfrm>
+            <a:off x="8010818" y="1875975"/>
+            <a:ext cx="885168" cy="908219"/>
+          </a:xfrm>
+          <a:prstGeom prst="rect">
+            <a:avLst/>
+          </a:prstGeom>
+        </p:spPr>
+      </p:pic>
+      <p:pic>
+        <p:nvPicPr>
+          <p:cNvPr id="38" name="Picture 37">
+            <a:extLst>
+              <a:ext uri="{FF2B5EF4-FFF2-40B4-BE49-F238E27FC236}">
+                <a16:creationId xmlns:a16="http://schemas.microsoft.com/office/drawing/2014/main" id="{7DD3F0C7-8497-A177-5A56-4C3D835DD6B9}"/>
+              </a:ext>
+            </a:extLst>
+          </p:cNvPr>
+          <p:cNvPicPr>
+            <a:picLocks noChangeAspect="1"/>
+          </p:cNvPicPr>
+          <p:nvPr/>
+        </p:nvPicPr>
+        <p:blipFill>
+          <a:blip r:embed="rId7"/>
+          <a:stretch>
+            <a:fillRect/>
+          </a:stretch>
+        </p:blipFill>
+        <p:spPr>
+          <a:xfrm>
+            <a:off x="2469349" y="3230752"/>
+            <a:ext cx="1015429" cy="902604"/>
+          </a:xfrm>
+          <a:prstGeom prst="rect">
+            <a:avLst/>
+          </a:prstGeom>
+        </p:spPr>
+      </p:pic>
+      <p:pic>
+        <p:nvPicPr>
+          <p:cNvPr id="46" name="Picture 45">
+            <a:extLst>
+              <a:ext uri="{FF2B5EF4-FFF2-40B4-BE49-F238E27FC236}">
+                <a16:creationId xmlns:a16="http://schemas.microsoft.com/office/drawing/2014/main" id="{6C0B221C-6749-2852-319F-C3D00574EA98}"/>
+              </a:ext>
+            </a:extLst>
+          </p:cNvPr>
+          <p:cNvPicPr>
+            <a:picLocks noChangeAspect="1"/>
+          </p:cNvPicPr>
+          <p:nvPr/>
+        </p:nvPicPr>
+        <p:blipFill>
+          <a:blip r:embed="rId8"/>
+          <a:stretch>
+            <a:fillRect/>
+          </a:stretch>
+        </p:blipFill>
+        <p:spPr>
+          <a:xfrm>
+            <a:off x="9592097" y="3775398"/>
+            <a:ext cx="882811" cy="972371"/>
+          </a:xfrm>
+          <a:prstGeom prst="rect">
+            <a:avLst/>
+          </a:prstGeom>
+        </p:spPr>
+      </p:pic>
+      <p:pic>
+        <p:nvPicPr>
+          <p:cNvPr id="54" name="Picture 53">
+            <a:extLst>
+              <a:ext uri="{FF2B5EF4-FFF2-40B4-BE49-F238E27FC236}">
+                <a16:creationId xmlns:a16="http://schemas.microsoft.com/office/drawing/2014/main" id="{0071B517-104F-21A1-CB2B-DFE0B1F24785}"/>
+              </a:ext>
+            </a:extLst>
+          </p:cNvPr>
+          <p:cNvPicPr>
+            <a:picLocks noChangeAspect="1"/>
+          </p:cNvPicPr>
+          <p:nvPr/>
+        </p:nvPicPr>
+        <p:blipFill>
+          <a:blip r:embed="rId7"/>
+          <a:stretch>
+            <a:fillRect/>
+          </a:stretch>
+        </p:blipFill>
+        <p:spPr>
+          <a:xfrm>
+            <a:off x="9534211" y="2481637"/>
+            <a:ext cx="1015429" cy="902604"/>
+          </a:xfrm>
+          <a:prstGeom prst="rect">
+            <a:avLst/>
+          </a:prstGeom>
+        </p:spPr>
+      </p:pic>
+      <p:pic>
+        <p:nvPicPr>
+          <p:cNvPr id="64" name="Picture 63">
+            <a:extLst>
+              <a:ext uri="{FF2B5EF4-FFF2-40B4-BE49-F238E27FC236}">
+                <a16:creationId xmlns:a16="http://schemas.microsoft.com/office/drawing/2014/main" id="{0A38EAFF-1B7C-C63B-A381-B61FB5D685C1}"/>
+              </a:ext>
+            </a:extLst>
+          </p:cNvPr>
+          <p:cNvPicPr>
+            <a:picLocks noChangeAspect="1"/>
+          </p:cNvPicPr>
+          <p:nvPr/>
+        </p:nvPicPr>
+        <p:blipFill>
+          <a:blip r:embed="rId2"/>
+          <a:stretch>
+            <a:fillRect/>
+          </a:stretch>
+        </p:blipFill>
+        <p:spPr>
+          <a:xfrm>
+            <a:off x="1718368" y="5325997"/>
+            <a:ext cx="1059635" cy="1003088"/>
+          </a:xfrm>
+          <a:prstGeom prst="rect">
+            <a:avLst/>
+          </a:prstGeom>
+        </p:spPr>
+      </p:pic>
+    </p:spTree>
+    <p:extLst>
+      <p:ext uri="{BB962C8B-B14F-4D97-AF65-F5344CB8AC3E}">
+        <p14:creationId xmlns:p14="http://schemas.microsoft.com/office/powerpoint/2010/main" val="2502804106"/>
+      </p:ext>
+    </p:extLst>
+  </p:cSld>
+  <p:clrMapOvr>
+    <a:masterClrMapping/>
+  </p:clrMapOvr>
+  <p:timing>
+    <p:tnLst>
+      <p:par>
+        <p:cTn id="1" dur="indefinite" restart="never" nodeType="tmRoot">
+          <p:childTnLst>
+            <p:seq concurrent="1" nextAc="seek">
+              <p:cTn id="2" dur="indefinite" nodeType="mainSeq">
+                <p:childTnLst>
+                  <p:par>
+                    <p:cTn id="3" fill="hold">
+                      <p:stCondLst>
+                        <p:cond delay="indefinite"/>
+                        <p:cond evt="onBegin" delay="0">
+                          <p:tn val="2"/>
+                        </p:cond>
+                      </p:stCondLst>
+                      <p:childTnLst>
+                        <p:par>
+                          <p:cTn id="4" fill="hold">
+                            <p:stCondLst>
+                              <p:cond delay="0"/>
+                            </p:stCondLst>
+                            <p:childTnLst>
+                              <p:par>
+                                <p:cTn id="5" presetID="1" presetClass="entr" presetSubtype="0" fill="hold" nodeType="withEffect">
+                                  <p:stCondLst>
+                                    <p:cond delay="0"/>
+                                  </p:stCondLst>
+                                  <p:childTnLst>
+                                    <p:set>
+                                      <p:cBhvr>
+                                        <p:cTn id="6" dur="1" fill="hold">
+                                          <p:stCondLst>
+                                            <p:cond delay="0"/>
+                                          </p:stCondLst>
+                                        </p:cTn>
+                                        <p:tgtEl>
+                                          <p:spTgt spid="20"/>
+                                        </p:tgtEl>
+                                        <p:attrNameLst>
+                                          <p:attrName>style.visibility</p:attrName>
+                                        </p:attrNameLst>
+                                      </p:cBhvr>
+                                      <p:to>
+                                        <p:strVal val="visible"/>
+                                      </p:to>
+                                    </p:set>
+                                  </p:childTnLst>
+                                </p:cTn>
+                              </p:par>
+                              <p:par>
+                                <p:cTn id="7" presetID="1" presetClass="entr" presetSubtype="0" fill="hold" grpId="0" nodeType="withEffect">
+                                  <p:stCondLst>
+                                    <p:cond delay="0"/>
+                                  </p:stCondLst>
+                                  <p:childTnLst>
+                                    <p:set>
+                                      <p:cBhvr>
+                                        <p:cTn id="8" dur="1" fill="hold">
+                                          <p:stCondLst>
+                                            <p:cond delay="0"/>
+                                          </p:stCondLst>
+                                        </p:cTn>
+                                        <p:tgtEl>
+                                          <p:spTgt spid="13"/>
+                                        </p:tgtEl>
+                                        <p:attrNameLst>
+                                          <p:attrName>style.visibility</p:attrName>
+                                        </p:attrNameLst>
+                                      </p:cBhvr>
+                                      <p:to>
+                                        <p:strVal val="visible"/>
+                                      </p:to>
+                                    </p:set>
+                                  </p:childTnLst>
+                                </p:cTn>
+                              </p:par>
+                              <p:par>
+                                <p:cTn id="9" presetID="1" presetClass="entr" presetSubtype="0" fill="hold" grpId="0" nodeType="withEffect">
+                                  <p:stCondLst>
+                                    <p:cond delay="0"/>
+                                  </p:stCondLst>
+                                  <p:childTnLst>
+                                    <p:set>
+                                      <p:cBhvr>
+                                        <p:cTn id="10" dur="1" fill="hold">
+                                          <p:stCondLst>
+                                            <p:cond delay="0"/>
+                                          </p:stCondLst>
+                                        </p:cTn>
+                                        <p:tgtEl>
+                                          <p:spTgt spid="49"/>
+                                        </p:tgtEl>
+                                        <p:attrNameLst>
+                                          <p:attrName>style.visibility</p:attrName>
+                                        </p:attrNameLst>
+                                      </p:cBhvr>
+                                      <p:to>
+                                        <p:strVal val="visible"/>
+                                      </p:to>
+                                    </p:set>
+                                  </p:childTnLst>
+                                </p:cTn>
+                              </p:par>
+                              <p:par>
+                                <p:cTn id="11" presetID="1" presetClass="entr" presetSubtype="0" fill="hold" grpId="0" nodeType="withEffect">
+                                  <p:stCondLst>
+                                    <p:cond delay="0"/>
+                                  </p:stCondLst>
+                                  <p:childTnLst>
+                                    <p:set>
+                                      <p:cBhvr>
+                                        <p:cTn id="12" dur="1" fill="hold">
+                                          <p:stCondLst>
+                                            <p:cond delay="0"/>
+                                          </p:stCondLst>
+                                        </p:cTn>
+                                        <p:tgtEl>
+                                          <p:spTgt spid="60"/>
+                                        </p:tgtEl>
+                                        <p:attrNameLst>
+                                          <p:attrName>style.visibility</p:attrName>
+                                        </p:attrNameLst>
+                                      </p:cBhvr>
+                                      <p:to>
+                                        <p:strVal val="visible"/>
+                                      </p:to>
+                                    </p:set>
+                                  </p:childTnLst>
+                                </p:cTn>
+                              </p:par>
+                              <p:par>
+                                <p:cTn id="13" presetID="1" presetClass="entr" presetSubtype="0" fill="hold" grpId="0" nodeType="withEffect">
+                                  <p:stCondLst>
+                                    <p:cond delay="0"/>
+                                  </p:stCondLst>
+                                  <p:childTnLst>
+                                    <p:set>
+                                      <p:cBhvr>
+                                        <p:cTn id="14" dur="1" fill="hold">
+                                          <p:stCondLst>
+                                            <p:cond delay="0"/>
+                                          </p:stCondLst>
+                                        </p:cTn>
+                                        <p:tgtEl>
+                                          <p:spTgt spid="48"/>
+                                        </p:tgtEl>
+                                        <p:attrNameLst>
+                                          <p:attrName>style.visibility</p:attrName>
+                                        </p:attrNameLst>
+                                      </p:cBhvr>
+                                      <p:to>
+                                        <p:strVal val="visible"/>
+                                      </p:to>
+                                    </p:set>
+                                  </p:childTnLst>
+                                </p:cTn>
+                              </p:par>
+                              <p:par>
+                                <p:cTn id="15" presetID="1" presetClass="entr" presetSubtype="0" fill="hold" nodeType="withEffect">
+                                  <p:stCondLst>
+                                    <p:cond delay="0"/>
+                                  </p:stCondLst>
+                                  <p:childTnLst>
+                                    <p:set>
+                                      <p:cBhvr>
+                                        <p:cTn id="16" dur="1" fill="hold">
+                                          <p:stCondLst>
+                                            <p:cond delay="0"/>
+                                          </p:stCondLst>
+                                        </p:cTn>
+                                        <p:tgtEl>
+                                          <p:spTgt spid="18"/>
+                                        </p:tgtEl>
+                                        <p:attrNameLst>
+                                          <p:attrName>style.visibility</p:attrName>
+                                        </p:attrNameLst>
+                                      </p:cBhvr>
+                                      <p:to>
+                                        <p:strVal val="visible"/>
+                                      </p:to>
+                                    </p:set>
+                                  </p:childTnLst>
+                                </p:cTn>
+                              </p:par>
+                              <p:par>
+                                <p:cTn id="17" presetID="1" presetClass="entr" presetSubtype="0" fill="hold" grpId="0" nodeType="withEffect">
+                                  <p:stCondLst>
+                                    <p:cond delay="0"/>
+                                  </p:stCondLst>
+                                  <p:childTnLst>
+                                    <p:set>
+                                      <p:cBhvr>
+                                        <p:cTn id="18" dur="1" fill="hold">
+                                          <p:stCondLst>
+                                            <p:cond delay="0"/>
+                                          </p:stCondLst>
+                                        </p:cTn>
+                                        <p:tgtEl>
+                                          <p:spTgt spid="58"/>
+                                        </p:tgtEl>
+                                        <p:attrNameLst>
+                                          <p:attrName>style.visibility</p:attrName>
+                                        </p:attrNameLst>
+                                      </p:cBhvr>
+                                      <p:to>
+                                        <p:strVal val="visible"/>
+                                      </p:to>
+                                    </p:set>
+                                  </p:childTnLst>
+                                </p:cTn>
+                              </p:par>
+                              <p:par>
+                                <p:cTn id="19" presetID="1" presetClass="entr" presetSubtype="0" fill="hold" nodeType="withEffect">
+                                  <p:stCondLst>
+                                    <p:cond delay="0"/>
+                                  </p:stCondLst>
+                                  <p:childTnLst>
+                                    <p:set>
+                                      <p:cBhvr>
+                                        <p:cTn id="20" dur="1" fill="hold">
+                                          <p:stCondLst>
+                                            <p:cond delay="0"/>
+                                          </p:stCondLst>
+                                        </p:cTn>
+                                        <p:tgtEl>
+                                          <p:spTgt spid="6"/>
+                                        </p:tgtEl>
+                                        <p:attrNameLst>
+                                          <p:attrName>style.visibility</p:attrName>
+                                        </p:attrNameLst>
+                                      </p:cBhvr>
+                                      <p:to>
+                                        <p:strVal val="visible"/>
+                                      </p:to>
+                                    </p:set>
+                                  </p:childTnLst>
+                                </p:cTn>
+                              </p:par>
+                            </p:childTnLst>
+                          </p:cTn>
+                        </p:par>
+                      </p:childTnLst>
+                    </p:cTn>
+                  </p:par>
+                  <p:par>
+                    <p:cTn id="21" fill="hold">
+                      <p:stCondLst>
+                        <p:cond delay="indefinite"/>
+                      </p:stCondLst>
+                      <p:childTnLst>
+                        <p:par>
+                          <p:cTn id="22" fill="hold">
+                            <p:stCondLst>
+                              <p:cond delay="0"/>
+                            </p:stCondLst>
+                            <p:childTnLst>
+                              <p:par>
+                                <p:cTn id="23" presetID="1" presetClass="entr" presetSubtype="0" fill="hold" nodeType="clickEffect">
+                                  <p:stCondLst>
+                                    <p:cond delay="0"/>
+                                  </p:stCondLst>
+                                  <p:childTnLst>
+                                    <p:set>
+                                      <p:cBhvr>
+                                        <p:cTn id="24" dur="1" fill="hold">
+                                          <p:stCondLst>
+                                            <p:cond delay="0"/>
+                                          </p:stCondLst>
+                                        </p:cTn>
+                                        <p:tgtEl>
+                                          <p:spTgt spid="34"/>
+                                        </p:tgtEl>
+                                        <p:attrNameLst>
+                                          <p:attrName>style.visibility</p:attrName>
+                                        </p:attrNameLst>
+                                      </p:cBhvr>
+                                      <p:to>
+                                        <p:strVal val="visible"/>
+                                      </p:to>
+                                    </p:set>
+                                  </p:childTnLst>
+                                </p:cTn>
+                              </p:par>
+                              <p:par>
+                                <p:cTn id="25" presetID="1" presetClass="entr" presetSubtype="0" fill="hold" nodeType="withEffect">
+                                  <p:stCondLst>
+                                    <p:cond delay="0"/>
+                                  </p:stCondLst>
+                                  <p:childTnLst>
+                                    <p:set>
+                                      <p:cBhvr>
+                                        <p:cTn id="26" dur="1" fill="hold">
+                                          <p:stCondLst>
+                                            <p:cond delay="0"/>
+                                          </p:stCondLst>
+                                        </p:cTn>
+                                        <p:tgtEl>
+                                          <p:spTgt spid="35"/>
+                                        </p:tgtEl>
+                                        <p:attrNameLst>
+                                          <p:attrName>style.visibility</p:attrName>
+                                        </p:attrNameLst>
+                                      </p:cBhvr>
+                                      <p:to>
+                                        <p:strVal val="visible"/>
+                                      </p:to>
+                                    </p:set>
+                                  </p:childTnLst>
+                                </p:cTn>
+                              </p:par>
+                              <p:par>
+                                <p:cTn id="27" presetID="1" presetClass="entr" presetSubtype="0" fill="hold" grpId="0" nodeType="withEffect">
+                                  <p:stCondLst>
+                                    <p:cond delay="0"/>
+                                  </p:stCondLst>
+                                  <p:childTnLst>
+                                    <p:set>
+                                      <p:cBhvr>
+                                        <p:cTn id="28" dur="1" fill="hold">
+                                          <p:stCondLst>
+                                            <p:cond delay="0"/>
+                                          </p:stCondLst>
+                                        </p:cTn>
+                                        <p:tgtEl>
+                                          <p:spTgt spid="50"/>
+                                        </p:tgtEl>
+                                        <p:attrNameLst>
+                                          <p:attrName>style.visibility</p:attrName>
+                                        </p:attrNameLst>
+                                      </p:cBhvr>
+                                      <p:to>
+                                        <p:strVal val="visible"/>
+                                      </p:to>
+                                    </p:set>
+                                  </p:childTnLst>
+                                </p:cTn>
+                              </p:par>
+                              <p:par>
+                                <p:cTn id="29" presetID="1" presetClass="entr" presetSubtype="0" fill="hold" grpId="0" nodeType="withEffect">
+                                  <p:stCondLst>
+                                    <p:cond delay="0"/>
+                                  </p:stCondLst>
+                                  <p:childTnLst>
+                                    <p:set>
+                                      <p:cBhvr>
+                                        <p:cTn id="30" dur="1" fill="hold">
+                                          <p:stCondLst>
+                                            <p:cond delay="0"/>
+                                          </p:stCondLst>
+                                        </p:cTn>
+                                        <p:tgtEl>
+                                          <p:spTgt spid="56"/>
+                                        </p:tgtEl>
+                                        <p:attrNameLst>
+                                          <p:attrName>style.visibility</p:attrName>
+                                        </p:attrNameLst>
+                                      </p:cBhvr>
+                                      <p:to>
+                                        <p:strVal val="visible"/>
+                                      </p:to>
+                                    </p:set>
+                                  </p:childTnLst>
+                                </p:cTn>
+                              </p:par>
+                              <p:par>
+                                <p:cTn id="31" presetID="1" presetClass="entr" presetSubtype="0" fill="hold" grpId="0" nodeType="withEffect">
+                                  <p:stCondLst>
+                                    <p:cond delay="0"/>
+                                  </p:stCondLst>
+                                  <p:childTnLst>
+                                    <p:set>
+                                      <p:cBhvr>
+                                        <p:cTn id="32" dur="1" fill="hold">
+                                          <p:stCondLst>
+                                            <p:cond delay="0"/>
+                                          </p:stCondLst>
+                                        </p:cTn>
+                                        <p:tgtEl>
+                                          <p:spTgt spid="55"/>
+                                        </p:tgtEl>
+                                        <p:attrNameLst>
+                                          <p:attrName>style.visibility</p:attrName>
+                                        </p:attrNameLst>
+                                      </p:cBhvr>
+                                      <p:to>
+                                        <p:strVal val="visible"/>
+                                      </p:to>
+                                    </p:set>
+                                  </p:childTnLst>
+                                </p:cTn>
+                              </p:par>
+                              <p:par>
+                                <p:cTn id="33" presetID="1" presetClass="entr" presetSubtype="0" fill="hold" grpId="0" nodeType="withEffect">
+                                  <p:stCondLst>
+                                    <p:cond delay="0"/>
+                                  </p:stCondLst>
+                                  <p:childTnLst>
+                                    <p:set>
+                                      <p:cBhvr>
+                                        <p:cTn id="34" dur="1" fill="hold">
+                                          <p:stCondLst>
+                                            <p:cond delay="0"/>
+                                          </p:stCondLst>
+                                        </p:cTn>
+                                        <p:tgtEl>
+                                          <p:spTgt spid="51"/>
+                                        </p:tgtEl>
+                                        <p:attrNameLst>
+                                          <p:attrName>style.visibility</p:attrName>
+                                        </p:attrNameLst>
+                                      </p:cBhvr>
+                                      <p:to>
+                                        <p:strVal val="visible"/>
+                                      </p:to>
+                                    </p:set>
+                                  </p:childTnLst>
+                                </p:cTn>
+                              </p:par>
+                              <p:par>
+                                <p:cTn id="35" presetID="1" presetClass="entr" presetSubtype="0" fill="hold" nodeType="withEffect">
+                                  <p:stCondLst>
+                                    <p:cond delay="0"/>
+                                  </p:stCondLst>
+                                  <p:childTnLst>
+                                    <p:set>
+                                      <p:cBhvr>
+                                        <p:cTn id="36" dur="1" fill="hold">
+                                          <p:stCondLst>
+                                            <p:cond delay="0"/>
+                                          </p:stCondLst>
+                                        </p:cTn>
+                                        <p:tgtEl>
+                                          <p:spTgt spid="36"/>
+                                        </p:tgtEl>
+                                        <p:attrNameLst>
+                                          <p:attrName>style.visibility</p:attrName>
+                                        </p:attrNameLst>
+                                      </p:cBhvr>
+                                      <p:to>
+                                        <p:strVal val="visible"/>
+                                      </p:to>
+                                    </p:set>
+                                  </p:childTnLst>
+                                </p:cTn>
+                              </p:par>
+                              <p:par>
+                                <p:cTn id="37" presetID="1" presetClass="entr" presetSubtype="0" fill="hold" nodeType="withEffect">
+                                  <p:stCondLst>
+                                    <p:cond delay="0"/>
+                                  </p:stCondLst>
+                                  <p:childTnLst>
+                                    <p:set>
+                                      <p:cBhvr>
+                                        <p:cTn id="38" dur="1" fill="hold">
+                                          <p:stCondLst>
+                                            <p:cond delay="0"/>
+                                          </p:stCondLst>
+                                        </p:cTn>
+                                        <p:tgtEl>
+                                          <p:spTgt spid="37"/>
+                                        </p:tgtEl>
+                                        <p:attrNameLst>
+                                          <p:attrName>style.visibility</p:attrName>
+                                        </p:attrNameLst>
+                                      </p:cBhvr>
+                                      <p:to>
+                                        <p:strVal val="visible"/>
+                                      </p:to>
+                                    </p:set>
+                                  </p:childTnLst>
+                                </p:cTn>
+                              </p:par>
+                              <p:par>
+                                <p:cTn id="39" presetID="1" presetClass="entr" presetSubtype="0" fill="hold" grpId="0" nodeType="withEffect">
+                                  <p:stCondLst>
+                                    <p:cond delay="0"/>
+                                  </p:stCondLst>
+                                  <p:childTnLst>
+                                    <p:set>
+                                      <p:cBhvr>
+                                        <p:cTn id="40" dur="1" fill="hold">
+                                          <p:stCondLst>
+                                            <p:cond delay="0"/>
+                                          </p:stCondLst>
+                                        </p:cTn>
+                                        <p:tgtEl>
+                                          <p:spTgt spid="59"/>
+                                        </p:tgtEl>
+                                        <p:attrNameLst>
+                                          <p:attrName>style.visibility</p:attrName>
+                                        </p:attrNameLst>
+                                      </p:cBhvr>
+                                      <p:to>
+                                        <p:strVal val="visible"/>
+                                      </p:to>
+                                    </p:set>
+                                  </p:childTnLst>
+                                </p:cTn>
+                              </p:par>
+                              <p:par>
+                                <p:cTn id="41" presetID="1" presetClass="entr" presetSubtype="0" fill="hold" nodeType="withEffect">
+                                  <p:stCondLst>
+                                    <p:cond delay="0"/>
+                                  </p:stCondLst>
+                                  <p:childTnLst>
+                                    <p:set>
+                                      <p:cBhvr>
+                                        <p:cTn id="42" dur="1" fill="hold">
+                                          <p:stCondLst>
+                                            <p:cond delay="0"/>
+                                          </p:stCondLst>
+                                        </p:cTn>
+                                        <p:tgtEl>
+                                          <p:spTgt spid="5"/>
+                                        </p:tgtEl>
+                                        <p:attrNameLst>
+                                          <p:attrName>style.visibility</p:attrName>
+                                        </p:attrNameLst>
+                                      </p:cBhvr>
+                                      <p:to>
+                                        <p:strVal val="visible"/>
+                                      </p:to>
+                                    </p:set>
+                                  </p:childTnLst>
+                                </p:cTn>
+                              </p:par>
+                              <p:par>
+                                <p:cTn id="43" presetID="1" presetClass="entr" presetSubtype="0" fill="hold" grpId="0" nodeType="withEffect">
+                                  <p:stCondLst>
+                                    <p:cond delay="0"/>
+                                  </p:stCondLst>
+                                  <p:childTnLst>
+                                    <p:set>
+                                      <p:cBhvr>
+                                        <p:cTn id="44" dur="1" fill="hold">
+                                          <p:stCondLst>
+                                            <p:cond delay="0"/>
+                                          </p:stCondLst>
+                                        </p:cTn>
+                                        <p:tgtEl>
+                                          <p:spTgt spid="52"/>
+                                        </p:tgtEl>
+                                        <p:attrNameLst>
+                                          <p:attrName>style.visibility</p:attrName>
+                                        </p:attrNameLst>
+                                      </p:cBhvr>
+                                      <p:to>
+                                        <p:strVal val="visible"/>
+                                      </p:to>
+                                    </p:set>
+                                  </p:childTnLst>
+                                </p:cTn>
+                              </p:par>
+                              <p:par>
+                                <p:cTn id="45" presetID="1" presetClass="entr" presetSubtype="0" fill="hold" grpId="0" nodeType="withEffect">
+                                  <p:stCondLst>
+                                    <p:cond delay="0"/>
+                                  </p:stCondLst>
+                                  <p:childTnLst>
+                                    <p:set>
+                                      <p:cBhvr>
+                                        <p:cTn id="46" dur="1" fill="hold">
+                                          <p:stCondLst>
+                                            <p:cond delay="0"/>
+                                          </p:stCondLst>
+                                        </p:cTn>
+                                        <p:tgtEl>
+                                          <p:spTgt spid="53"/>
+                                        </p:tgtEl>
+                                        <p:attrNameLst>
+                                          <p:attrName>style.visibility</p:attrName>
+                                        </p:attrNameLst>
+                                      </p:cBhvr>
+                                      <p:to>
+                                        <p:strVal val="visible"/>
+                                      </p:to>
+                                    </p:set>
+                                  </p:childTnLst>
+                                </p:cTn>
+                              </p:par>
+                              <p:par>
+                                <p:cTn id="47" presetID="1" presetClass="entr" presetSubtype="0" fill="hold" grpId="0" nodeType="withEffect">
+                                  <p:stCondLst>
+                                    <p:cond delay="0"/>
+                                  </p:stCondLst>
+                                  <p:childTnLst>
+                                    <p:set>
+                                      <p:cBhvr>
+                                        <p:cTn id="48" dur="1" fill="hold">
+                                          <p:stCondLst>
+                                            <p:cond delay="0"/>
+                                          </p:stCondLst>
+                                        </p:cTn>
+                                        <p:tgtEl>
+                                          <p:spTgt spid="61"/>
+                                        </p:tgtEl>
+                                        <p:attrNameLst>
+                                          <p:attrName>style.visibility</p:attrName>
+                                        </p:attrNameLst>
+                                      </p:cBhvr>
+                                      <p:to>
+                                        <p:strVal val="visible"/>
+                                      </p:to>
+                                    </p:set>
+                                  </p:childTnLst>
+                                </p:cTn>
+                              </p:par>
+                              <p:par>
+                                <p:cTn id="49" presetID="1" presetClass="entr" presetSubtype="0" fill="hold" grpId="0" nodeType="withEffect">
+                                  <p:stCondLst>
+                                    <p:cond delay="0"/>
+                                  </p:stCondLst>
+                                  <p:childTnLst>
+                                    <p:set>
+                                      <p:cBhvr>
+                                        <p:cTn id="50" dur="1" fill="hold">
+                                          <p:stCondLst>
+                                            <p:cond delay="0"/>
+                                          </p:stCondLst>
+                                        </p:cTn>
+                                        <p:tgtEl>
+                                          <p:spTgt spid="62"/>
+                                        </p:tgtEl>
+                                        <p:attrNameLst>
+                                          <p:attrName>style.visibility</p:attrName>
+                                        </p:attrNameLst>
+                                      </p:cBhvr>
+                                      <p:to>
+                                        <p:strVal val="visible"/>
+                                      </p:to>
+                                    </p:set>
+                                  </p:childTnLst>
+                                </p:cTn>
+                              </p:par>
+                            </p:childTnLst>
+                          </p:cTn>
+                        </p:par>
+                      </p:childTnLst>
+                    </p:cTn>
+                  </p:par>
+                </p:childTnLst>
+              </p:cTn>
+              <p:prevCondLst>
+                <p:cond evt="onPrev" delay="0">
+                  <p:tgtEl>
+                    <p:sldTgt/>
+                  </p:tgtEl>
+                </p:cond>
+              </p:prevCondLst>
+              <p:nextCondLst>
+                <p:cond evt="onNext" delay="0">
+                  <p:tgtEl>
+                    <p:sldTgt/>
+                  </p:tgtEl>
+                </p:cond>
+              </p:nextCondLst>
+            </p:seq>
+          </p:childTnLst>
+        </p:cTn>
+      </p:par>
+    </p:tnLst>
+    <p:bldLst>
+      <p:bldP spid="58" grpId="0"/>
+      <p:bldP spid="59" grpId="0"/>
+      <p:bldP spid="13" grpId="0"/>
+      <p:bldP spid="49" grpId="0"/>
+      <p:bldP spid="50" grpId="0"/>
+      <p:bldP spid="51" grpId="0"/>
+      <p:bldP spid="52" grpId="0"/>
+      <p:bldP spid="53" grpId="0"/>
+      <p:bldP spid="60" grpId="0" animBg="1"/>
+      <p:bldP spid="48" grpId="0" animBg="1"/>
+      <p:bldP spid="55" grpId="0" animBg="1"/>
+      <p:bldP spid="56" grpId="0" animBg="1"/>
+      <p:bldP spid="61" grpId="0" animBg="1"/>
+      <p:bldP spid="62" grpId="0" animBg="1"/>
+    </p:bldLst>
+  </p:timing>
+</p:sld>
+</file>
+
+<file path=ppt/slides/slide4.xml><?xml version="1.0" encoding="utf-8"?>
+<p:sld xmlns:a="http://schemas.openxmlformats.org/drawingml/2006/main" xmlns:r="http://schemas.openxmlformats.org/officeDocument/2006/relationships" xmlns:p="http://schemas.openxmlformats.org/presentationml/2006/main">
+  <p:cSld>
+    <p:spTree>
+      <p:nvGrpSpPr>
+        <p:cNvPr id="1" name=""/>
+        <p:cNvGrpSpPr/>
+        <p:nvPr/>
+      </p:nvGrpSpPr>
+      <p:grpSpPr>
+        <a:xfrm>
+          <a:off x="0" y="0"/>
+          <a:ext cx="0" cy="0"/>
+          <a:chOff x="0" y="0"/>
+          <a:chExt cx="0" cy="0"/>
+        </a:xfrm>
+      </p:grpSpPr>
       <p:cxnSp>
         <p:nvCxnSpPr>
           <p:cNvPr id="18" name="Straight Arrow Connector 17">
@@ -12020,7 +14917,7 @@
 </p:sld>
 </file>
 
-<file path=ppt/slides/slide4.xml><?xml version="1.0" encoding="utf-8"?>
+<file path=ppt/slides/slide5.xml><?xml version="1.0" encoding="utf-8"?>
 <p:sld xmlns:a="http://schemas.openxmlformats.org/drawingml/2006/main" xmlns:r="http://schemas.openxmlformats.org/officeDocument/2006/relationships" xmlns:p="http://schemas.openxmlformats.org/presentationml/2006/main">
   <p:cSld>
     <p:spTree>
@@ -12378,7 +15275,7 @@
 </p:sld>
 </file>
 
-<file path=ppt/slides/slide5.xml><?xml version="1.0" encoding="utf-8"?>
+<file path=ppt/slides/slide6.xml><?xml version="1.0" encoding="utf-8"?>
 <p:sld xmlns:a="http://schemas.openxmlformats.org/drawingml/2006/main" xmlns:r="http://schemas.openxmlformats.org/officeDocument/2006/relationships" xmlns:p="http://schemas.openxmlformats.org/presentationml/2006/main">
   <p:cSld>
     <p:spTree>
@@ -12736,7 +15633,7 @@
 </p:sld>
 </file>
 
-<file path=ppt/slides/slide6.xml><?xml version="1.0" encoding="utf-8"?>
+<file path=ppt/slides/slide7.xml><?xml version="1.0" encoding="utf-8"?>
 <p:sld xmlns:a="http://schemas.openxmlformats.org/drawingml/2006/main" xmlns:r="http://schemas.openxmlformats.org/officeDocument/2006/relationships" xmlns:p="http://schemas.openxmlformats.org/presentationml/2006/main">
   <p:cSld>
     <p:bg>
@@ -13748,7 +16645,7 @@
 </p:sld>
 </file>
 
-<file path=ppt/slides/slide7.xml><?xml version="1.0" encoding="utf-8"?>
+<file path=ppt/slides/slide8.xml><?xml version="1.0" encoding="utf-8"?>
 <p:sld xmlns:a="http://schemas.openxmlformats.org/drawingml/2006/main" xmlns:r="http://schemas.openxmlformats.org/officeDocument/2006/relationships" xmlns:p="http://schemas.openxmlformats.org/presentationml/2006/main">
   <p:cSld>
     <p:spTree>
@@ -14073,7 +16970,7 @@
 </p:sld>
 </file>
 
-<file path=ppt/slides/slide8.xml><?xml version="1.0" encoding="utf-8"?>
+<file path=ppt/slides/slide9.xml><?xml version="1.0" encoding="utf-8"?>
 <p:sld xmlns:a="http://schemas.openxmlformats.org/drawingml/2006/main" xmlns:r="http://schemas.openxmlformats.org/officeDocument/2006/relationships" xmlns:p="http://schemas.openxmlformats.org/presentationml/2006/main">
   <p:cSld>
     <p:spTree>
@@ -14233,209 +17130,6 @@
                                         </p:cTn>
                                         <p:tgtEl>
                                           <p:spTgt spid="13"/>
-                                        </p:tgtEl>
-                                        <p:attrNameLst>
-                                          <p:attrName>style.visibility</p:attrName>
-                                        </p:attrNameLst>
-                                      </p:cBhvr>
-                                      <p:to>
-                                        <p:strVal val="hidden"/>
-                                      </p:to>
-                                    </p:set>
-                                  </p:childTnLst>
-                                </p:cTn>
-                              </p:par>
-                            </p:childTnLst>
-                          </p:cTn>
-                        </p:par>
-                      </p:childTnLst>
-                    </p:cTn>
-                  </p:par>
-                </p:childTnLst>
-              </p:cTn>
-              <p:prevCondLst>
-                <p:cond evt="onPrev" delay="0">
-                  <p:tgtEl>
-                    <p:sldTgt/>
-                  </p:tgtEl>
-                </p:cond>
-              </p:prevCondLst>
-              <p:nextCondLst>
-                <p:cond evt="onNext" delay="0">
-                  <p:tgtEl>
-                    <p:sldTgt/>
-                  </p:tgtEl>
-                </p:cond>
-              </p:nextCondLst>
-            </p:seq>
-          </p:childTnLst>
-        </p:cTn>
-      </p:par>
-    </p:tnLst>
-  </p:timing>
-</p:sld>
-</file>
-
-<file path=ppt/slides/slide9.xml><?xml version="1.0" encoding="utf-8"?>
-<p:sld xmlns:a="http://schemas.openxmlformats.org/drawingml/2006/main" xmlns:r="http://schemas.openxmlformats.org/officeDocument/2006/relationships" xmlns:p="http://schemas.openxmlformats.org/presentationml/2006/main">
-  <p:cSld>
-    <p:spTree>
-      <p:nvGrpSpPr>
-        <p:cNvPr id="1" name=""/>
-        <p:cNvGrpSpPr/>
-        <p:nvPr/>
-      </p:nvGrpSpPr>
-      <p:grpSpPr>
-        <a:xfrm>
-          <a:off x="0" y="0"/>
-          <a:ext cx="0" cy="0"/>
-          <a:chOff x="0" y="0"/>
-          <a:chExt cx="0" cy="0"/>
-        </a:xfrm>
-      </p:grpSpPr>
-      <p:pic>
-        <p:nvPicPr>
-          <p:cNvPr id="18" name="Picture 17" descr="A picture containing text&#10;&#10;Description automatically generated">
-            <a:extLst>
-              <a:ext uri="{FF2B5EF4-FFF2-40B4-BE49-F238E27FC236}">
-                <a16:creationId xmlns:a16="http://schemas.microsoft.com/office/drawing/2014/main" id="{94578D29-70AC-C948-BA7F-69991F353187}"/>
-              </a:ext>
-            </a:extLst>
-          </p:cNvPr>
-          <p:cNvPicPr>
-            <a:picLocks noChangeAspect="1"/>
-          </p:cNvPicPr>
-          <p:nvPr/>
-        </p:nvPicPr>
-        <p:blipFill rotWithShape="1">
-          <a:blip r:embed="rId2"/>
-          <a:srcRect l="4697" t="20140" r="4719" b="19957"/>
-          <a:stretch/>
-        </p:blipFill>
-        <p:spPr>
-          <a:xfrm>
-            <a:off x="340355" y="2517568"/>
-            <a:ext cx="3326681" cy="2199903"/>
-          </a:xfrm>
-          <a:prstGeom prst="rect">
-            <a:avLst/>
-          </a:prstGeom>
-        </p:spPr>
-      </p:pic>
-      <p:pic>
-        <p:nvPicPr>
-          <p:cNvPr id="6" name="Picture 5" descr="A picture containing text&#10;&#10;Description automatically generated">
-            <a:extLst>
-              <a:ext uri="{FF2B5EF4-FFF2-40B4-BE49-F238E27FC236}">
-                <a16:creationId xmlns:a16="http://schemas.microsoft.com/office/drawing/2014/main" id="{41569761-AEA6-7D44-BED4-C9349FFA1D6C}"/>
-              </a:ext>
-            </a:extLst>
-          </p:cNvPr>
-          <p:cNvPicPr>
-            <a:picLocks noChangeAspect="1"/>
-          </p:cNvPicPr>
-          <p:nvPr/>
-        </p:nvPicPr>
-        <p:blipFill rotWithShape="1">
-          <a:blip r:embed="rId2"/>
-          <a:srcRect l="4697" t="20140" r="4719" b="19957"/>
-          <a:stretch/>
-        </p:blipFill>
-        <p:spPr>
-          <a:xfrm>
-            <a:off x="8524964" y="2517567"/>
-            <a:ext cx="3326681" cy="2199903"/>
-          </a:xfrm>
-          <a:prstGeom prst="rect">
-            <a:avLst/>
-          </a:prstGeom>
-        </p:spPr>
-      </p:pic>
-      <p:pic>
-        <p:nvPicPr>
-          <p:cNvPr id="7" name="Picture 6" descr="A picture containing text&#10;&#10;Description automatically generated">
-            <a:extLst>
-              <a:ext uri="{FF2B5EF4-FFF2-40B4-BE49-F238E27FC236}">
-                <a16:creationId xmlns:a16="http://schemas.microsoft.com/office/drawing/2014/main" id="{929A2FA3-3E54-5B46-A09C-1F9FD464AE1B}"/>
-              </a:ext>
-            </a:extLst>
-          </p:cNvPr>
-          <p:cNvPicPr>
-            <a:picLocks noChangeAspect="1"/>
-          </p:cNvPicPr>
-          <p:nvPr/>
-        </p:nvPicPr>
-        <p:blipFill rotWithShape="1">
-          <a:blip r:embed="rId2">
-            <a:duotone>
-              <a:schemeClr val="accent4">
-                <a:shade val="45000"/>
-                <a:satMod val="135000"/>
-              </a:schemeClr>
-              <a:prstClr val="white"/>
-            </a:duotone>
-          </a:blip>
-          <a:srcRect l="4697" t="20140" r="4719" b="19957"/>
-          <a:stretch/>
-        </p:blipFill>
-        <p:spPr>
-          <a:xfrm>
-            <a:off x="4432659" y="2517567"/>
-            <a:ext cx="3326682" cy="2199904"/>
-          </a:xfrm>
-          <a:prstGeom prst="rect">
-            <a:avLst/>
-          </a:prstGeom>
-        </p:spPr>
-      </p:pic>
-    </p:spTree>
-    <p:extLst>
-      <p:ext uri="{BB962C8B-B14F-4D97-AF65-F5344CB8AC3E}">
-        <p14:creationId xmlns:p14="http://schemas.microsoft.com/office/powerpoint/2010/main" val="2937348982"/>
-      </p:ext>
-    </p:extLst>
-  </p:cSld>
-  <p:clrMapOvr>
-    <a:masterClrMapping/>
-  </p:clrMapOvr>
-  <p:timing>
-    <p:tnLst>
-      <p:par>
-        <p:cTn id="1" dur="indefinite" restart="never" nodeType="tmRoot">
-          <p:childTnLst>
-            <p:seq concurrent="1" nextAc="seek">
-              <p:cTn id="2" dur="indefinite" nodeType="mainSeq">
-                <p:childTnLst>
-                  <p:par>
-                    <p:cTn id="3" fill="hold">
-                      <p:stCondLst>
-                        <p:cond delay="indefinite"/>
-                        <p:cond evt="onBegin" delay="0">
-                          <p:tn val="2"/>
-                        </p:cond>
-                      </p:stCondLst>
-                      <p:childTnLst>
-                        <p:par>
-                          <p:cTn id="4" fill="hold">
-                            <p:stCondLst>
-                              <p:cond delay="0"/>
-                            </p:stCondLst>
-                            <p:childTnLst>
-                              <p:par>
-                                <p:cTn id="5" presetID="1" presetClass="exit" presetSubtype="0" fill="hold" nodeType="afterEffect">
-                                  <p:stCondLst>
-                                    <p:cond delay="700"/>
-                                  </p:stCondLst>
-                                  <p:childTnLst>
-                                    <p:set>
-                                      <p:cBhvr>
-                                        <p:cTn id="6" dur="1" fill="hold">
-                                          <p:stCondLst>
-                                            <p:cond delay="0"/>
-                                          </p:stCondLst>
-                                        </p:cTn>
-                                        <p:tgtEl>
-                                          <p:spTgt spid="7"/>
                                         </p:tgtEl>
                                         <p:attrNameLst>
                                           <p:attrName>style.visibility</p:attrName>

</xml_diff>